<commit_message>
add extract text from ppt
</commit_message>
<xml_diff>
--- a/1.pptx
+++ b/1.pptx
@@ -130,7 +130,7 @@
           <p:cNvPr id="2" name="제목 1">
             <a:extLst>
               <a:ext uri="{FF2B5EF4-FFF2-40B4-BE49-F238E27FC236}">
-                <a16:creationId xmlns:a16="http://schemas.microsoft.com/office/drawing/2014/main" id="{72211CF0-80BD-06A1-EF13-59DE5780E8BF}"/>
+                <a16:creationId xmlns:a16="http://schemas.microsoft.com/office/drawing/2014/main" id="{6396D7B9-CD00-8DA3-D44A-BBBED6D90D3B}"/>
               </a:ext>
             </a:extLst>
           </p:cNvPr>
@@ -167,7 +167,7 @@
           <p:cNvPr id="3" name="부제목 2">
             <a:extLst>
               <a:ext uri="{FF2B5EF4-FFF2-40B4-BE49-F238E27FC236}">
-                <a16:creationId xmlns:a16="http://schemas.microsoft.com/office/drawing/2014/main" id="{70C6C628-7DB2-5E57-DCCE-EFBEF6E079BF}"/>
+                <a16:creationId xmlns:a16="http://schemas.microsoft.com/office/drawing/2014/main" id="{B81B33F6-6C78-DA2F-384C-C049B9126BE5}"/>
               </a:ext>
             </a:extLst>
           </p:cNvPr>
@@ -237,7 +237,7 @@
           <p:cNvPr id="4" name="날짜 개체 틀 3">
             <a:extLst>
               <a:ext uri="{FF2B5EF4-FFF2-40B4-BE49-F238E27FC236}">
-                <a16:creationId xmlns:a16="http://schemas.microsoft.com/office/drawing/2014/main" id="{0A17251F-78F5-92C4-C02A-C72ADC101EC0}"/>
+                <a16:creationId xmlns:a16="http://schemas.microsoft.com/office/drawing/2014/main" id="{643708FC-71CF-5FB6-18A9-A97BE8921F58}"/>
               </a:ext>
             </a:extLst>
           </p:cNvPr>
@@ -253,7 +253,7 @@
           <a:bodyPr/>
           <a:lstStyle/>
           <a:p>
-            <a:fld id="{8F678A20-BC07-4238-8F42-C6B8C8EAA3E5}" type="datetimeFigureOut">
+            <a:fld id="{20C091FE-7301-4091-ADD6-67AD4FDA71E3}" type="datetimeFigureOut">
               <a:rPr lang="ko-KR" altLang="en-US" smtClean="0"/>
               <a:t>2023-04-16</a:t>
             </a:fld>
@@ -266,7 +266,7 @@
           <p:cNvPr id="5" name="바닥글 개체 틀 4">
             <a:extLst>
               <a:ext uri="{FF2B5EF4-FFF2-40B4-BE49-F238E27FC236}">
-                <a16:creationId xmlns:a16="http://schemas.microsoft.com/office/drawing/2014/main" id="{953B2F56-D97D-B6A0-44F5-0597337A384F}"/>
+                <a16:creationId xmlns:a16="http://schemas.microsoft.com/office/drawing/2014/main" id="{E51FD9BD-EF23-A37E-DD3E-9261FAC4F54A}"/>
               </a:ext>
             </a:extLst>
           </p:cNvPr>
@@ -291,7 +291,7 @@
           <p:cNvPr id="6" name="슬라이드 번호 개체 틀 5">
             <a:extLst>
               <a:ext uri="{FF2B5EF4-FFF2-40B4-BE49-F238E27FC236}">
-                <a16:creationId xmlns:a16="http://schemas.microsoft.com/office/drawing/2014/main" id="{85869502-2847-6F2E-C5C7-5CF1BFD1E0C8}"/>
+                <a16:creationId xmlns:a16="http://schemas.microsoft.com/office/drawing/2014/main" id="{6DD21B3A-5627-08F8-4B84-E73E084AF861}"/>
               </a:ext>
             </a:extLst>
           </p:cNvPr>
@@ -307,7 +307,7 @@
           <a:bodyPr/>
           <a:lstStyle/>
           <a:p>
-            <a:fld id="{A9ACF27C-ADDA-45C4-B6BB-F49BFBD5495D}" type="slidenum">
+            <a:fld id="{13D1B0FA-2E16-42A9-847B-D967D4F65B3B}" type="slidenum">
               <a:rPr lang="ko-KR" altLang="en-US" smtClean="0"/>
               <a:t>‹#›</a:t>
             </a:fld>
@@ -318,7 +318,7 @@
     </p:spTree>
     <p:extLst>
       <p:ext uri="{BB962C8B-B14F-4D97-AF65-F5344CB8AC3E}">
-        <p14:creationId xmlns:p14="http://schemas.microsoft.com/office/powerpoint/2010/main" val="3472312309"/>
+        <p14:creationId xmlns:p14="http://schemas.microsoft.com/office/powerpoint/2010/main" val="668611537"/>
       </p:ext>
     </p:extLst>
   </p:cSld>
@@ -350,7 +350,7 @@
           <p:cNvPr id="2" name="제목 1">
             <a:extLst>
               <a:ext uri="{FF2B5EF4-FFF2-40B4-BE49-F238E27FC236}">
-                <a16:creationId xmlns:a16="http://schemas.microsoft.com/office/drawing/2014/main" id="{854843C2-DAEB-25C7-368B-44924CF37820}"/>
+                <a16:creationId xmlns:a16="http://schemas.microsoft.com/office/drawing/2014/main" id="{DB0832FB-F3F0-41D6-BE2B-4273C75569F0}"/>
               </a:ext>
             </a:extLst>
           </p:cNvPr>
@@ -378,7 +378,7 @@
           <p:cNvPr id="3" name="세로 텍스트 개체 틀 2">
             <a:extLst>
               <a:ext uri="{FF2B5EF4-FFF2-40B4-BE49-F238E27FC236}">
-                <a16:creationId xmlns:a16="http://schemas.microsoft.com/office/drawing/2014/main" id="{7F1EDA2F-6535-CD36-FAD4-2772F81E749D}"/>
+                <a16:creationId xmlns:a16="http://schemas.microsoft.com/office/drawing/2014/main" id="{F0760A6C-C376-A5BC-19CC-00FA961982F8}"/>
               </a:ext>
             </a:extLst>
           </p:cNvPr>
@@ -435,7 +435,7 @@
           <p:cNvPr id="4" name="날짜 개체 틀 3">
             <a:extLst>
               <a:ext uri="{FF2B5EF4-FFF2-40B4-BE49-F238E27FC236}">
-                <a16:creationId xmlns:a16="http://schemas.microsoft.com/office/drawing/2014/main" id="{CEC55574-140C-7945-3EC0-1FD5147691E9}"/>
+                <a16:creationId xmlns:a16="http://schemas.microsoft.com/office/drawing/2014/main" id="{9A9AB285-28CC-0059-2651-C3E3CDD984C2}"/>
               </a:ext>
             </a:extLst>
           </p:cNvPr>
@@ -451,7 +451,7 @@
           <a:bodyPr/>
           <a:lstStyle/>
           <a:p>
-            <a:fld id="{8F678A20-BC07-4238-8F42-C6B8C8EAA3E5}" type="datetimeFigureOut">
+            <a:fld id="{20C091FE-7301-4091-ADD6-67AD4FDA71E3}" type="datetimeFigureOut">
               <a:rPr lang="ko-KR" altLang="en-US" smtClean="0"/>
               <a:t>2023-04-16</a:t>
             </a:fld>
@@ -464,7 +464,7 @@
           <p:cNvPr id="5" name="바닥글 개체 틀 4">
             <a:extLst>
               <a:ext uri="{FF2B5EF4-FFF2-40B4-BE49-F238E27FC236}">
-                <a16:creationId xmlns:a16="http://schemas.microsoft.com/office/drawing/2014/main" id="{748F202D-2F77-CA3E-659F-3B1DC8C96D50}"/>
+                <a16:creationId xmlns:a16="http://schemas.microsoft.com/office/drawing/2014/main" id="{DB645B1B-52B9-C664-B037-24FC5772993A}"/>
               </a:ext>
             </a:extLst>
           </p:cNvPr>
@@ -489,7 +489,7 @@
           <p:cNvPr id="6" name="슬라이드 번호 개체 틀 5">
             <a:extLst>
               <a:ext uri="{FF2B5EF4-FFF2-40B4-BE49-F238E27FC236}">
-                <a16:creationId xmlns:a16="http://schemas.microsoft.com/office/drawing/2014/main" id="{744E706F-7945-6C17-34F5-58E80FD19D82}"/>
+                <a16:creationId xmlns:a16="http://schemas.microsoft.com/office/drawing/2014/main" id="{88516ADD-79BB-84F2-E65E-0B17AA5F08E4}"/>
               </a:ext>
             </a:extLst>
           </p:cNvPr>
@@ -505,7 +505,7 @@
           <a:bodyPr/>
           <a:lstStyle/>
           <a:p>
-            <a:fld id="{A9ACF27C-ADDA-45C4-B6BB-F49BFBD5495D}" type="slidenum">
+            <a:fld id="{13D1B0FA-2E16-42A9-847B-D967D4F65B3B}" type="slidenum">
               <a:rPr lang="ko-KR" altLang="en-US" smtClean="0"/>
               <a:t>‹#›</a:t>
             </a:fld>
@@ -516,7 +516,7 @@
     </p:spTree>
     <p:extLst>
       <p:ext uri="{BB962C8B-B14F-4D97-AF65-F5344CB8AC3E}">
-        <p14:creationId xmlns:p14="http://schemas.microsoft.com/office/powerpoint/2010/main" val="1757862980"/>
+        <p14:creationId xmlns:p14="http://schemas.microsoft.com/office/powerpoint/2010/main" val="1201387076"/>
       </p:ext>
     </p:extLst>
   </p:cSld>
@@ -548,7 +548,7 @@
           <p:cNvPr id="2" name="세로 제목 1">
             <a:extLst>
               <a:ext uri="{FF2B5EF4-FFF2-40B4-BE49-F238E27FC236}">
-                <a16:creationId xmlns:a16="http://schemas.microsoft.com/office/drawing/2014/main" id="{73C57A2A-E8C0-6C5D-C00E-A7DC89DA1593}"/>
+                <a16:creationId xmlns:a16="http://schemas.microsoft.com/office/drawing/2014/main" id="{CB72F181-2DCF-AC67-7EA2-0EA231E16428}"/>
               </a:ext>
             </a:extLst>
           </p:cNvPr>
@@ -581,7 +581,7 @@
           <p:cNvPr id="3" name="세로 텍스트 개체 틀 2">
             <a:extLst>
               <a:ext uri="{FF2B5EF4-FFF2-40B4-BE49-F238E27FC236}">
-                <a16:creationId xmlns:a16="http://schemas.microsoft.com/office/drawing/2014/main" id="{68F4436D-2B5D-10CA-5BDD-4E722FFA701E}"/>
+                <a16:creationId xmlns:a16="http://schemas.microsoft.com/office/drawing/2014/main" id="{33D1241A-ED10-F91B-6A99-F300D31B060E}"/>
               </a:ext>
             </a:extLst>
           </p:cNvPr>
@@ -643,7 +643,7 @@
           <p:cNvPr id="4" name="날짜 개체 틀 3">
             <a:extLst>
               <a:ext uri="{FF2B5EF4-FFF2-40B4-BE49-F238E27FC236}">
-                <a16:creationId xmlns:a16="http://schemas.microsoft.com/office/drawing/2014/main" id="{58869511-2D2F-E8CF-CE80-5AD565457776}"/>
+                <a16:creationId xmlns:a16="http://schemas.microsoft.com/office/drawing/2014/main" id="{544E2C00-49C6-84F6-743F-8E2FC6DBC173}"/>
               </a:ext>
             </a:extLst>
           </p:cNvPr>
@@ -659,7 +659,7 @@
           <a:bodyPr/>
           <a:lstStyle/>
           <a:p>
-            <a:fld id="{8F678A20-BC07-4238-8F42-C6B8C8EAA3E5}" type="datetimeFigureOut">
+            <a:fld id="{20C091FE-7301-4091-ADD6-67AD4FDA71E3}" type="datetimeFigureOut">
               <a:rPr lang="ko-KR" altLang="en-US" smtClean="0"/>
               <a:t>2023-04-16</a:t>
             </a:fld>
@@ -672,7 +672,7 @@
           <p:cNvPr id="5" name="바닥글 개체 틀 4">
             <a:extLst>
               <a:ext uri="{FF2B5EF4-FFF2-40B4-BE49-F238E27FC236}">
-                <a16:creationId xmlns:a16="http://schemas.microsoft.com/office/drawing/2014/main" id="{7D6AB314-BA96-48B4-76D5-357F020621B1}"/>
+                <a16:creationId xmlns:a16="http://schemas.microsoft.com/office/drawing/2014/main" id="{81646585-5943-C08E-4CEA-DF222354C4C1}"/>
               </a:ext>
             </a:extLst>
           </p:cNvPr>
@@ -697,7 +697,7 @@
           <p:cNvPr id="6" name="슬라이드 번호 개체 틀 5">
             <a:extLst>
               <a:ext uri="{FF2B5EF4-FFF2-40B4-BE49-F238E27FC236}">
-                <a16:creationId xmlns:a16="http://schemas.microsoft.com/office/drawing/2014/main" id="{BEB8D78E-3C5A-DC88-21FA-DDC4A4CD60A1}"/>
+                <a16:creationId xmlns:a16="http://schemas.microsoft.com/office/drawing/2014/main" id="{BC8A429B-EC19-03A2-5449-96F1BF67234D}"/>
               </a:ext>
             </a:extLst>
           </p:cNvPr>
@@ -713,7 +713,7 @@
           <a:bodyPr/>
           <a:lstStyle/>
           <a:p>
-            <a:fld id="{A9ACF27C-ADDA-45C4-B6BB-F49BFBD5495D}" type="slidenum">
+            <a:fld id="{13D1B0FA-2E16-42A9-847B-D967D4F65B3B}" type="slidenum">
               <a:rPr lang="ko-KR" altLang="en-US" smtClean="0"/>
               <a:t>‹#›</a:t>
             </a:fld>
@@ -724,7 +724,7 @@
     </p:spTree>
     <p:extLst>
       <p:ext uri="{BB962C8B-B14F-4D97-AF65-F5344CB8AC3E}">
-        <p14:creationId xmlns:p14="http://schemas.microsoft.com/office/powerpoint/2010/main" val="2542265948"/>
+        <p14:creationId xmlns:p14="http://schemas.microsoft.com/office/powerpoint/2010/main" val="3294290415"/>
       </p:ext>
     </p:extLst>
   </p:cSld>
@@ -756,7 +756,7 @@
           <p:cNvPr id="2" name="제목 1">
             <a:extLst>
               <a:ext uri="{FF2B5EF4-FFF2-40B4-BE49-F238E27FC236}">
-                <a16:creationId xmlns:a16="http://schemas.microsoft.com/office/drawing/2014/main" id="{B0130EB0-0B05-2963-39DC-E696F030844F}"/>
+                <a16:creationId xmlns:a16="http://schemas.microsoft.com/office/drawing/2014/main" id="{6417681A-6510-995B-92E3-52562E552F64}"/>
               </a:ext>
             </a:extLst>
           </p:cNvPr>
@@ -784,7 +784,7 @@
           <p:cNvPr id="3" name="내용 개체 틀 2">
             <a:extLst>
               <a:ext uri="{FF2B5EF4-FFF2-40B4-BE49-F238E27FC236}">
-                <a16:creationId xmlns:a16="http://schemas.microsoft.com/office/drawing/2014/main" id="{CB2E3C6E-20F3-8DA6-D8E7-701E210F5165}"/>
+                <a16:creationId xmlns:a16="http://schemas.microsoft.com/office/drawing/2014/main" id="{F85E7FDC-9CEE-D2D4-1180-A0263393E3BE}"/>
               </a:ext>
             </a:extLst>
           </p:cNvPr>
@@ -841,7 +841,7 @@
           <p:cNvPr id="4" name="날짜 개체 틀 3">
             <a:extLst>
               <a:ext uri="{FF2B5EF4-FFF2-40B4-BE49-F238E27FC236}">
-                <a16:creationId xmlns:a16="http://schemas.microsoft.com/office/drawing/2014/main" id="{1E24D571-C4B3-E012-2C7C-84534DF5A949}"/>
+                <a16:creationId xmlns:a16="http://schemas.microsoft.com/office/drawing/2014/main" id="{77C1AA71-D241-49AD-CDF0-8BFFF532C25B}"/>
               </a:ext>
             </a:extLst>
           </p:cNvPr>
@@ -857,7 +857,7 @@
           <a:bodyPr/>
           <a:lstStyle/>
           <a:p>
-            <a:fld id="{8F678A20-BC07-4238-8F42-C6B8C8EAA3E5}" type="datetimeFigureOut">
+            <a:fld id="{20C091FE-7301-4091-ADD6-67AD4FDA71E3}" type="datetimeFigureOut">
               <a:rPr lang="ko-KR" altLang="en-US" smtClean="0"/>
               <a:t>2023-04-16</a:t>
             </a:fld>
@@ -870,7 +870,7 @@
           <p:cNvPr id="5" name="바닥글 개체 틀 4">
             <a:extLst>
               <a:ext uri="{FF2B5EF4-FFF2-40B4-BE49-F238E27FC236}">
-                <a16:creationId xmlns:a16="http://schemas.microsoft.com/office/drawing/2014/main" id="{C70166FB-A566-C18A-E38A-632DE5B07F0E}"/>
+                <a16:creationId xmlns:a16="http://schemas.microsoft.com/office/drawing/2014/main" id="{4B4E0F4C-C2C0-E975-A46B-BC81DADF03CC}"/>
               </a:ext>
             </a:extLst>
           </p:cNvPr>
@@ -895,7 +895,7 @@
           <p:cNvPr id="6" name="슬라이드 번호 개체 틀 5">
             <a:extLst>
               <a:ext uri="{FF2B5EF4-FFF2-40B4-BE49-F238E27FC236}">
-                <a16:creationId xmlns:a16="http://schemas.microsoft.com/office/drawing/2014/main" id="{F3CB1F03-3049-5F57-A118-662D72EB5129}"/>
+                <a16:creationId xmlns:a16="http://schemas.microsoft.com/office/drawing/2014/main" id="{0504DAAE-0935-4078-086B-BB653EE08682}"/>
               </a:ext>
             </a:extLst>
           </p:cNvPr>
@@ -911,7 +911,7 @@
           <a:bodyPr/>
           <a:lstStyle/>
           <a:p>
-            <a:fld id="{A9ACF27C-ADDA-45C4-B6BB-F49BFBD5495D}" type="slidenum">
+            <a:fld id="{13D1B0FA-2E16-42A9-847B-D967D4F65B3B}" type="slidenum">
               <a:rPr lang="ko-KR" altLang="en-US" smtClean="0"/>
               <a:t>‹#›</a:t>
             </a:fld>
@@ -922,7 +922,7 @@
     </p:spTree>
     <p:extLst>
       <p:ext uri="{BB962C8B-B14F-4D97-AF65-F5344CB8AC3E}">
-        <p14:creationId xmlns:p14="http://schemas.microsoft.com/office/powerpoint/2010/main" val="788596328"/>
+        <p14:creationId xmlns:p14="http://schemas.microsoft.com/office/powerpoint/2010/main" val="930271966"/>
       </p:ext>
     </p:extLst>
   </p:cSld>
@@ -954,7 +954,7 @@
           <p:cNvPr id="2" name="제목 1">
             <a:extLst>
               <a:ext uri="{FF2B5EF4-FFF2-40B4-BE49-F238E27FC236}">
-                <a16:creationId xmlns:a16="http://schemas.microsoft.com/office/drawing/2014/main" id="{99C0D837-CD35-79FC-820C-D1435169A311}"/>
+                <a16:creationId xmlns:a16="http://schemas.microsoft.com/office/drawing/2014/main" id="{460A5465-9FEC-530C-1D93-66477755E991}"/>
               </a:ext>
             </a:extLst>
           </p:cNvPr>
@@ -991,7 +991,7 @@
           <p:cNvPr id="3" name="텍스트 개체 틀 2">
             <a:extLst>
               <a:ext uri="{FF2B5EF4-FFF2-40B4-BE49-F238E27FC236}">
-                <a16:creationId xmlns:a16="http://schemas.microsoft.com/office/drawing/2014/main" id="{8498012D-8CFF-F091-E803-4C5F058969C4}"/>
+                <a16:creationId xmlns:a16="http://schemas.microsoft.com/office/drawing/2014/main" id="{358E5319-EFEB-6091-5F41-B86A0C1B32AC}"/>
               </a:ext>
             </a:extLst>
           </p:cNvPr>
@@ -1116,7 +1116,7 @@
           <p:cNvPr id="4" name="날짜 개체 틀 3">
             <a:extLst>
               <a:ext uri="{FF2B5EF4-FFF2-40B4-BE49-F238E27FC236}">
-                <a16:creationId xmlns:a16="http://schemas.microsoft.com/office/drawing/2014/main" id="{A5A34CF3-EFC6-8DC8-54EB-459106A89552}"/>
+                <a16:creationId xmlns:a16="http://schemas.microsoft.com/office/drawing/2014/main" id="{550133CE-0940-0F84-CF93-FFBA1883D25E}"/>
               </a:ext>
             </a:extLst>
           </p:cNvPr>
@@ -1132,7 +1132,7 @@
           <a:bodyPr/>
           <a:lstStyle/>
           <a:p>
-            <a:fld id="{8F678A20-BC07-4238-8F42-C6B8C8EAA3E5}" type="datetimeFigureOut">
+            <a:fld id="{20C091FE-7301-4091-ADD6-67AD4FDA71E3}" type="datetimeFigureOut">
               <a:rPr lang="ko-KR" altLang="en-US" smtClean="0"/>
               <a:t>2023-04-16</a:t>
             </a:fld>
@@ -1145,7 +1145,7 @@
           <p:cNvPr id="5" name="바닥글 개체 틀 4">
             <a:extLst>
               <a:ext uri="{FF2B5EF4-FFF2-40B4-BE49-F238E27FC236}">
-                <a16:creationId xmlns:a16="http://schemas.microsoft.com/office/drawing/2014/main" id="{74CFBB07-C01B-8524-C5A4-6D5B7F03A4C4}"/>
+                <a16:creationId xmlns:a16="http://schemas.microsoft.com/office/drawing/2014/main" id="{E2B706A3-7E60-34D3-CC1F-A250C63EC86C}"/>
               </a:ext>
             </a:extLst>
           </p:cNvPr>
@@ -1170,7 +1170,7 @@
           <p:cNvPr id="6" name="슬라이드 번호 개체 틀 5">
             <a:extLst>
               <a:ext uri="{FF2B5EF4-FFF2-40B4-BE49-F238E27FC236}">
-                <a16:creationId xmlns:a16="http://schemas.microsoft.com/office/drawing/2014/main" id="{ABE95825-9E3D-B860-9DEF-F9206619B3ED}"/>
+                <a16:creationId xmlns:a16="http://schemas.microsoft.com/office/drawing/2014/main" id="{65EE9C3E-F5C4-5B44-7F6B-6890EF61DFF4}"/>
               </a:ext>
             </a:extLst>
           </p:cNvPr>
@@ -1186,7 +1186,7 @@
           <a:bodyPr/>
           <a:lstStyle/>
           <a:p>
-            <a:fld id="{A9ACF27C-ADDA-45C4-B6BB-F49BFBD5495D}" type="slidenum">
+            <a:fld id="{13D1B0FA-2E16-42A9-847B-D967D4F65B3B}" type="slidenum">
               <a:rPr lang="ko-KR" altLang="en-US" smtClean="0"/>
               <a:t>‹#›</a:t>
             </a:fld>
@@ -1197,7 +1197,7 @@
     </p:spTree>
     <p:extLst>
       <p:ext uri="{BB962C8B-B14F-4D97-AF65-F5344CB8AC3E}">
-        <p14:creationId xmlns:p14="http://schemas.microsoft.com/office/powerpoint/2010/main" val="2625483641"/>
+        <p14:creationId xmlns:p14="http://schemas.microsoft.com/office/powerpoint/2010/main" val="2340899702"/>
       </p:ext>
     </p:extLst>
   </p:cSld>
@@ -1229,7 +1229,7 @@
           <p:cNvPr id="2" name="제목 1">
             <a:extLst>
               <a:ext uri="{FF2B5EF4-FFF2-40B4-BE49-F238E27FC236}">
-                <a16:creationId xmlns:a16="http://schemas.microsoft.com/office/drawing/2014/main" id="{6DA81773-21F2-8A67-1103-D19C80F44671}"/>
+                <a16:creationId xmlns:a16="http://schemas.microsoft.com/office/drawing/2014/main" id="{BBD2A981-2E0D-5DC4-0381-B3CD72CDC8A5}"/>
               </a:ext>
             </a:extLst>
           </p:cNvPr>
@@ -1257,7 +1257,7 @@
           <p:cNvPr id="3" name="내용 개체 틀 2">
             <a:extLst>
               <a:ext uri="{FF2B5EF4-FFF2-40B4-BE49-F238E27FC236}">
-                <a16:creationId xmlns:a16="http://schemas.microsoft.com/office/drawing/2014/main" id="{69B435E7-E932-1469-6F4F-B67E0AABBF60}"/>
+                <a16:creationId xmlns:a16="http://schemas.microsoft.com/office/drawing/2014/main" id="{0B33030D-498D-AB2A-0CC5-94B4EBEB655A}"/>
               </a:ext>
             </a:extLst>
           </p:cNvPr>
@@ -1319,7 +1319,7 @@
           <p:cNvPr id="4" name="내용 개체 틀 3">
             <a:extLst>
               <a:ext uri="{FF2B5EF4-FFF2-40B4-BE49-F238E27FC236}">
-                <a16:creationId xmlns:a16="http://schemas.microsoft.com/office/drawing/2014/main" id="{BB514CFF-7626-991C-DF63-2295DCD874E1}"/>
+                <a16:creationId xmlns:a16="http://schemas.microsoft.com/office/drawing/2014/main" id="{5C23D992-4DEF-2FBE-D226-CF6C11631A95}"/>
               </a:ext>
             </a:extLst>
           </p:cNvPr>
@@ -1381,7 +1381,7 @@
           <p:cNvPr id="5" name="날짜 개체 틀 4">
             <a:extLst>
               <a:ext uri="{FF2B5EF4-FFF2-40B4-BE49-F238E27FC236}">
-                <a16:creationId xmlns:a16="http://schemas.microsoft.com/office/drawing/2014/main" id="{FD24BDF3-D4E3-04E3-7731-6DF1AF354DD9}"/>
+                <a16:creationId xmlns:a16="http://schemas.microsoft.com/office/drawing/2014/main" id="{F2C878C3-FD60-2BFD-97C1-C8EC62A7D5CE}"/>
               </a:ext>
             </a:extLst>
           </p:cNvPr>
@@ -1397,7 +1397,7 @@
           <a:bodyPr/>
           <a:lstStyle/>
           <a:p>
-            <a:fld id="{8F678A20-BC07-4238-8F42-C6B8C8EAA3E5}" type="datetimeFigureOut">
+            <a:fld id="{20C091FE-7301-4091-ADD6-67AD4FDA71E3}" type="datetimeFigureOut">
               <a:rPr lang="ko-KR" altLang="en-US" smtClean="0"/>
               <a:t>2023-04-16</a:t>
             </a:fld>
@@ -1410,7 +1410,7 @@
           <p:cNvPr id="6" name="바닥글 개체 틀 5">
             <a:extLst>
               <a:ext uri="{FF2B5EF4-FFF2-40B4-BE49-F238E27FC236}">
-                <a16:creationId xmlns:a16="http://schemas.microsoft.com/office/drawing/2014/main" id="{5DF474AA-6EB2-100F-247C-8D4F48E7C201}"/>
+                <a16:creationId xmlns:a16="http://schemas.microsoft.com/office/drawing/2014/main" id="{4CF417FB-787E-7A4D-4CF4-D5C3E225A445}"/>
               </a:ext>
             </a:extLst>
           </p:cNvPr>
@@ -1435,7 +1435,7 @@
           <p:cNvPr id="7" name="슬라이드 번호 개체 틀 6">
             <a:extLst>
               <a:ext uri="{FF2B5EF4-FFF2-40B4-BE49-F238E27FC236}">
-                <a16:creationId xmlns:a16="http://schemas.microsoft.com/office/drawing/2014/main" id="{3AB930E7-B4CD-A50E-E8AF-34BE43A26355}"/>
+                <a16:creationId xmlns:a16="http://schemas.microsoft.com/office/drawing/2014/main" id="{E538F414-E273-91F2-6748-D3341EAE797C}"/>
               </a:ext>
             </a:extLst>
           </p:cNvPr>
@@ -1451,7 +1451,7 @@
           <a:bodyPr/>
           <a:lstStyle/>
           <a:p>
-            <a:fld id="{A9ACF27C-ADDA-45C4-B6BB-F49BFBD5495D}" type="slidenum">
+            <a:fld id="{13D1B0FA-2E16-42A9-847B-D967D4F65B3B}" type="slidenum">
               <a:rPr lang="ko-KR" altLang="en-US" smtClean="0"/>
               <a:t>‹#›</a:t>
             </a:fld>
@@ -1462,7 +1462,7 @@
     </p:spTree>
     <p:extLst>
       <p:ext uri="{BB962C8B-B14F-4D97-AF65-F5344CB8AC3E}">
-        <p14:creationId xmlns:p14="http://schemas.microsoft.com/office/powerpoint/2010/main" val="890246039"/>
+        <p14:creationId xmlns:p14="http://schemas.microsoft.com/office/powerpoint/2010/main" val="2930954736"/>
       </p:ext>
     </p:extLst>
   </p:cSld>
@@ -1494,7 +1494,7 @@
           <p:cNvPr id="2" name="제목 1">
             <a:extLst>
               <a:ext uri="{FF2B5EF4-FFF2-40B4-BE49-F238E27FC236}">
-                <a16:creationId xmlns:a16="http://schemas.microsoft.com/office/drawing/2014/main" id="{15B7CDF9-517D-965A-2E20-AD7964D35B95}"/>
+                <a16:creationId xmlns:a16="http://schemas.microsoft.com/office/drawing/2014/main" id="{57D01BB7-8D3A-8D81-4C47-8B149BEC64C7}"/>
               </a:ext>
             </a:extLst>
           </p:cNvPr>
@@ -1527,7 +1527,7 @@
           <p:cNvPr id="3" name="텍스트 개체 틀 2">
             <a:extLst>
               <a:ext uri="{FF2B5EF4-FFF2-40B4-BE49-F238E27FC236}">
-                <a16:creationId xmlns:a16="http://schemas.microsoft.com/office/drawing/2014/main" id="{5AC5A6E2-F77D-EB66-3025-070B500469F8}"/>
+                <a16:creationId xmlns:a16="http://schemas.microsoft.com/office/drawing/2014/main" id="{09256C2E-A04B-CDE8-148D-07EE9DF37E80}"/>
               </a:ext>
             </a:extLst>
           </p:cNvPr>
@@ -1598,7 +1598,7 @@
           <p:cNvPr id="4" name="내용 개체 틀 3">
             <a:extLst>
               <a:ext uri="{FF2B5EF4-FFF2-40B4-BE49-F238E27FC236}">
-                <a16:creationId xmlns:a16="http://schemas.microsoft.com/office/drawing/2014/main" id="{826314A3-603E-86C8-49E0-819A17AF170A}"/>
+                <a16:creationId xmlns:a16="http://schemas.microsoft.com/office/drawing/2014/main" id="{D1BD01D9-0683-E6F3-AD43-0441AB147A61}"/>
               </a:ext>
             </a:extLst>
           </p:cNvPr>
@@ -1660,7 +1660,7 @@
           <p:cNvPr id="5" name="텍스트 개체 틀 4">
             <a:extLst>
               <a:ext uri="{FF2B5EF4-FFF2-40B4-BE49-F238E27FC236}">
-                <a16:creationId xmlns:a16="http://schemas.microsoft.com/office/drawing/2014/main" id="{3F8FD598-9ED6-2A78-D56C-C68B1AC15A3C}"/>
+                <a16:creationId xmlns:a16="http://schemas.microsoft.com/office/drawing/2014/main" id="{428DD6F9-A938-7EDB-888D-E2CC6BA86417}"/>
               </a:ext>
             </a:extLst>
           </p:cNvPr>
@@ -1731,7 +1731,7 @@
           <p:cNvPr id="6" name="내용 개체 틀 5">
             <a:extLst>
               <a:ext uri="{FF2B5EF4-FFF2-40B4-BE49-F238E27FC236}">
-                <a16:creationId xmlns:a16="http://schemas.microsoft.com/office/drawing/2014/main" id="{595D5BE6-CF05-F241-9D17-F205285079D5}"/>
+                <a16:creationId xmlns:a16="http://schemas.microsoft.com/office/drawing/2014/main" id="{45463132-8EA3-E63C-FC9D-661D1DB0E1E7}"/>
               </a:ext>
             </a:extLst>
           </p:cNvPr>
@@ -1793,7 +1793,7 @@
           <p:cNvPr id="7" name="날짜 개체 틀 6">
             <a:extLst>
               <a:ext uri="{FF2B5EF4-FFF2-40B4-BE49-F238E27FC236}">
-                <a16:creationId xmlns:a16="http://schemas.microsoft.com/office/drawing/2014/main" id="{13F82EA9-8347-9399-6468-09D31D6B8267}"/>
+                <a16:creationId xmlns:a16="http://schemas.microsoft.com/office/drawing/2014/main" id="{6186D4DF-1262-A88B-3E7E-B72F05A660CF}"/>
               </a:ext>
             </a:extLst>
           </p:cNvPr>
@@ -1809,7 +1809,7 @@
           <a:bodyPr/>
           <a:lstStyle/>
           <a:p>
-            <a:fld id="{8F678A20-BC07-4238-8F42-C6B8C8EAA3E5}" type="datetimeFigureOut">
+            <a:fld id="{20C091FE-7301-4091-ADD6-67AD4FDA71E3}" type="datetimeFigureOut">
               <a:rPr lang="ko-KR" altLang="en-US" smtClean="0"/>
               <a:t>2023-04-16</a:t>
             </a:fld>
@@ -1822,7 +1822,7 @@
           <p:cNvPr id="8" name="바닥글 개체 틀 7">
             <a:extLst>
               <a:ext uri="{FF2B5EF4-FFF2-40B4-BE49-F238E27FC236}">
-                <a16:creationId xmlns:a16="http://schemas.microsoft.com/office/drawing/2014/main" id="{3DE0DD13-D8C0-E590-60C9-D9B15ED3CB9B}"/>
+                <a16:creationId xmlns:a16="http://schemas.microsoft.com/office/drawing/2014/main" id="{B0D1C80F-4C46-0A22-F56B-1F1E7D8F8DD1}"/>
               </a:ext>
             </a:extLst>
           </p:cNvPr>
@@ -1847,7 +1847,7 @@
           <p:cNvPr id="9" name="슬라이드 번호 개체 틀 8">
             <a:extLst>
               <a:ext uri="{FF2B5EF4-FFF2-40B4-BE49-F238E27FC236}">
-                <a16:creationId xmlns:a16="http://schemas.microsoft.com/office/drawing/2014/main" id="{4FFE2DC9-B781-0C78-8A60-BB329E01A6A5}"/>
+                <a16:creationId xmlns:a16="http://schemas.microsoft.com/office/drawing/2014/main" id="{66C11EB4-466D-ED20-ED48-79D2FC8FB627}"/>
               </a:ext>
             </a:extLst>
           </p:cNvPr>
@@ -1863,7 +1863,7 @@
           <a:bodyPr/>
           <a:lstStyle/>
           <a:p>
-            <a:fld id="{A9ACF27C-ADDA-45C4-B6BB-F49BFBD5495D}" type="slidenum">
+            <a:fld id="{13D1B0FA-2E16-42A9-847B-D967D4F65B3B}" type="slidenum">
               <a:rPr lang="ko-KR" altLang="en-US" smtClean="0"/>
               <a:t>‹#›</a:t>
             </a:fld>
@@ -1874,7 +1874,7 @@
     </p:spTree>
     <p:extLst>
       <p:ext uri="{BB962C8B-B14F-4D97-AF65-F5344CB8AC3E}">
-        <p14:creationId xmlns:p14="http://schemas.microsoft.com/office/powerpoint/2010/main" val="2279972753"/>
+        <p14:creationId xmlns:p14="http://schemas.microsoft.com/office/powerpoint/2010/main" val="1755649508"/>
       </p:ext>
     </p:extLst>
   </p:cSld>
@@ -1906,7 +1906,7 @@
           <p:cNvPr id="2" name="제목 1">
             <a:extLst>
               <a:ext uri="{FF2B5EF4-FFF2-40B4-BE49-F238E27FC236}">
-                <a16:creationId xmlns:a16="http://schemas.microsoft.com/office/drawing/2014/main" id="{1AF9927C-3875-DD2A-C6DA-30B2E917F954}"/>
+                <a16:creationId xmlns:a16="http://schemas.microsoft.com/office/drawing/2014/main" id="{30D5F299-66E4-8996-980D-D5F04F2D48DC}"/>
               </a:ext>
             </a:extLst>
           </p:cNvPr>
@@ -1934,7 +1934,7 @@
           <p:cNvPr id="3" name="날짜 개체 틀 2">
             <a:extLst>
               <a:ext uri="{FF2B5EF4-FFF2-40B4-BE49-F238E27FC236}">
-                <a16:creationId xmlns:a16="http://schemas.microsoft.com/office/drawing/2014/main" id="{7949873A-FD80-2DF7-C3EF-68616000B073}"/>
+                <a16:creationId xmlns:a16="http://schemas.microsoft.com/office/drawing/2014/main" id="{A653DC57-7267-47CD-67E7-28ED7BB0B190}"/>
               </a:ext>
             </a:extLst>
           </p:cNvPr>
@@ -1950,7 +1950,7 @@
           <a:bodyPr/>
           <a:lstStyle/>
           <a:p>
-            <a:fld id="{8F678A20-BC07-4238-8F42-C6B8C8EAA3E5}" type="datetimeFigureOut">
+            <a:fld id="{20C091FE-7301-4091-ADD6-67AD4FDA71E3}" type="datetimeFigureOut">
               <a:rPr lang="ko-KR" altLang="en-US" smtClean="0"/>
               <a:t>2023-04-16</a:t>
             </a:fld>
@@ -1963,7 +1963,7 @@
           <p:cNvPr id="4" name="바닥글 개체 틀 3">
             <a:extLst>
               <a:ext uri="{FF2B5EF4-FFF2-40B4-BE49-F238E27FC236}">
-                <a16:creationId xmlns:a16="http://schemas.microsoft.com/office/drawing/2014/main" id="{036DFE8E-E5D9-BF8A-8B52-8FA49DE198EB}"/>
+                <a16:creationId xmlns:a16="http://schemas.microsoft.com/office/drawing/2014/main" id="{478B35E6-2C96-00CC-899B-20FCC74BC056}"/>
               </a:ext>
             </a:extLst>
           </p:cNvPr>
@@ -1988,7 +1988,7 @@
           <p:cNvPr id="5" name="슬라이드 번호 개체 틀 4">
             <a:extLst>
               <a:ext uri="{FF2B5EF4-FFF2-40B4-BE49-F238E27FC236}">
-                <a16:creationId xmlns:a16="http://schemas.microsoft.com/office/drawing/2014/main" id="{74AD9365-A5D8-BB51-C1EC-928D97A3D612}"/>
+                <a16:creationId xmlns:a16="http://schemas.microsoft.com/office/drawing/2014/main" id="{69BFE6CE-2AE2-40FF-330D-D1F4BE6B2166}"/>
               </a:ext>
             </a:extLst>
           </p:cNvPr>
@@ -2004,7 +2004,7 @@
           <a:bodyPr/>
           <a:lstStyle/>
           <a:p>
-            <a:fld id="{A9ACF27C-ADDA-45C4-B6BB-F49BFBD5495D}" type="slidenum">
+            <a:fld id="{13D1B0FA-2E16-42A9-847B-D967D4F65B3B}" type="slidenum">
               <a:rPr lang="ko-KR" altLang="en-US" smtClean="0"/>
               <a:t>‹#›</a:t>
             </a:fld>
@@ -2015,7 +2015,7 @@
     </p:spTree>
     <p:extLst>
       <p:ext uri="{BB962C8B-B14F-4D97-AF65-F5344CB8AC3E}">
-        <p14:creationId xmlns:p14="http://schemas.microsoft.com/office/powerpoint/2010/main" val="356428264"/>
+        <p14:creationId xmlns:p14="http://schemas.microsoft.com/office/powerpoint/2010/main" val="921334960"/>
       </p:ext>
     </p:extLst>
   </p:cSld>
@@ -2047,7 +2047,7 @@
           <p:cNvPr id="2" name="날짜 개체 틀 1">
             <a:extLst>
               <a:ext uri="{FF2B5EF4-FFF2-40B4-BE49-F238E27FC236}">
-                <a16:creationId xmlns:a16="http://schemas.microsoft.com/office/drawing/2014/main" id="{7F74B022-EA91-989A-B956-84305D9334E7}"/>
+                <a16:creationId xmlns:a16="http://schemas.microsoft.com/office/drawing/2014/main" id="{F2FDCDA7-1361-8BCB-084E-A787DB135EAC}"/>
               </a:ext>
             </a:extLst>
           </p:cNvPr>
@@ -2063,7 +2063,7 @@
           <a:bodyPr/>
           <a:lstStyle/>
           <a:p>
-            <a:fld id="{8F678A20-BC07-4238-8F42-C6B8C8EAA3E5}" type="datetimeFigureOut">
+            <a:fld id="{20C091FE-7301-4091-ADD6-67AD4FDA71E3}" type="datetimeFigureOut">
               <a:rPr lang="ko-KR" altLang="en-US" smtClean="0"/>
               <a:t>2023-04-16</a:t>
             </a:fld>
@@ -2076,7 +2076,7 @@
           <p:cNvPr id="3" name="바닥글 개체 틀 2">
             <a:extLst>
               <a:ext uri="{FF2B5EF4-FFF2-40B4-BE49-F238E27FC236}">
-                <a16:creationId xmlns:a16="http://schemas.microsoft.com/office/drawing/2014/main" id="{F7A1E6F6-4603-B318-9DD0-97AC6925E01A}"/>
+                <a16:creationId xmlns:a16="http://schemas.microsoft.com/office/drawing/2014/main" id="{5631D8C7-FCEF-F07B-085C-FD5AC1783440}"/>
               </a:ext>
             </a:extLst>
           </p:cNvPr>
@@ -2101,7 +2101,7 @@
           <p:cNvPr id="4" name="슬라이드 번호 개체 틀 3">
             <a:extLst>
               <a:ext uri="{FF2B5EF4-FFF2-40B4-BE49-F238E27FC236}">
-                <a16:creationId xmlns:a16="http://schemas.microsoft.com/office/drawing/2014/main" id="{5994C2A9-1F5F-A12B-7E89-DE92F2788F76}"/>
+                <a16:creationId xmlns:a16="http://schemas.microsoft.com/office/drawing/2014/main" id="{83F3EDC8-C0C6-DFF3-DE6C-C45993F177E6}"/>
               </a:ext>
             </a:extLst>
           </p:cNvPr>
@@ -2117,7 +2117,7 @@
           <a:bodyPr/>
           <a:lstStyle/>
           <a:p>
-            <a:fld id="{A9ACF27C-ADDA-45C4-B6BB-F49BFBD5495D}" type="slidenum">
+            <a:fld id="{13D1B0FA-2E16-42A9-847B-D967D4F65B3B}" type="slidenum">
               <a:rPr lang="ko-KR" altLang="en-US" smtClean="0"/>
               <a:t>‹#›</a:t>
             </a:fld>
@@ -2128,7 +2128,7 @@
     </p:spTree>
     <p:extLst>
       <p:ext uri="{BB962C8B-B14F-4D97-AF65-F5344CB8AC3E}">
-        <p14:creationId xmlns:p14="http://schemas.microsoft.com/office/powerpoint/2010/main" val="1164953119"/>
+        <p14:creationId xmlns:p14="http://schemas.microsoft.com/office/powerpoint/2010/main" val="3099891658"/>
       </p:ext>
     </p:extLst>
   </p:cSld>
@@ -2160,7 +2160,7 @@
           <p:cNvPr id="2" name="제목 1">
             <a:extLst>
               <a:ext uri="{FF2B5EF4-FFF2-40B4-BE49-F238E27FC236}">
-                <a16:creationId xmlns:a16="http://schemas.microsoft.com/office/drawing/2014/main" id="{23DEE3EA-91C0-7F89-20B4-3B28CA226F12}"/>
+                <a16:creationId xmlns:a16="http://schemas.microsoft.com/office/drawing/2014/main" id="{233BC8B8-AC71-0554-44FE-D81CD1A50781}"/>
               </a:ext>
             </a:extLst>
           </p:cNvPr>
@@ -2197,7 +2197,7 @@
           <p:cNvPr id="3" name="내용 개체 틀 2">
             <a:extLst>
               <a:ext uri="{FF2B5EF4-FFF2-40B4-BE49-F238E27FC236}">
-                <a16:creationId xmlns:a16="http://schemas.microsoft.com/office/drawing/2014/main" id="{0E5316D5-E935-F131-3CEB-08D74233CDAA}"/>
+                <a16:creationId xmlns:a16="http://schemas.microsoft.com/office/drawing/2014/main" id="{DBBE83AF-D9BF-9941-6ECE-E07EDA8682F7}"/>
               </a:ext>
             </a:extLst>
           </p:cNvPr>
@@ -2287,7 +2287,7 @@
           <p:cNvPr id="4" name="텍스트 개체 틀 3">
             <a:extLst>
               <a:ext uri="{FF2B5EF4-FFF2-40B4-BE49-F238E27FC236}">
-                <a16:creationId xmlns:a16="http://schemas.microsoft.com/office/drawing/2014/main" id="{07A627C1-ADFD-FA4A-44A4-EA097ACFC354}"/>
+                <a16:creationId xmlns:a16="http://schemas.microsoft.com/office/drawing/2014/main" id="{A8B7841F-AFD5-7ED7-89C0-D36158958D25}"/>
               </a:ext>
             </a:extLst>
           </p:cNvPr>
@@ -2358,7 +2358,7 @@
           <p:cNvPr id="5" name="날짜 개체 틀 4">
             <a:extLst>
               <a:ext uri="{FF2B5EF4-FFF2-40B4-BE49-F238E27FC236}">
-                <a16:creationId xmlns:a16="http://schemas.microsoft.com/office/drawing/2014/main" id="{028B3FCD-12F1-2496-EFEE-67C2BC5E61E0}"/>
+                <a16:creationId xmlns:a16="http://schemas.microsoft.com/office/drawing/2014/main" id="{1EEC6B74-4790-F89D-FC50-0E3AA346CD3B}"/>
               </a:ext>
             </a:extLst>
           </p:cNvPr>
@@ -2374,7 +2374,7 @@
           <a:bodyPr/>
           <a:lstStyle/>
           <a:p>
-            <a:fld id="{8F678A20-BC07-4238-8F42-C6B8C8EAA3E5}" type="datetimeFigureOut">
+            <a:fld id="{20C091FE-7301-4091-ADD6-67AD4FDA71E3}" type="datetimeFigureOut">
               <a:rPr lang="ko-KR" altLang="en-US" smtClean="0"/>
               <a:t>2023-04-16</a:t>
             </a:fld>
@@ -2387,7 +2387,7 @@
           <p:cNvPr id="6" name="바닥글 개체 틀 5">
             <a:extLst>
               <a:ext uri="{FF2B5EF4-FFF2-40B4-BE49-F238E27FC236}">
-                <a16:creationId xmlns:a16="http://schemas.microsoft.com/office/drawing/2014/main" id="{256BB2A3-BA20-96B7-3AE3-4B4C8C5FF466}"/>
+                <a16:creationId xmlns:a16="http://schemas.microsoft.com/office/drawing/2014/main" id="{0218DFA4-BD33-79B3-B428-B803709EFEB6}"/>
               </a:ext>
             </a:extLst>
           </p:cNvPr>
@@ -2412,7 +2412,7 @@
           <p:cNvPr id="7" name="슬라이드 번호 개체 틀 6">
             <a:extLst>
               <a:ext uri="{FF2B5EF4-FFF2-40B4-BE49-F238E27FC236}">
-                <a16:creationId xmlns:a16="http://schemas.microsoft.com/office/drawing/2014/main" id="{802FB15D-2F98-C264-D810-8E705F9F6202}"/>
+                <a16:creationId xmlns:a16="http://schemas.microsoft.com/office/drawing/2014/main" id="{D1DB5FA6-9BCA-8ADA-5EBA-AAF09E5468B2}"/>
               </a:ext>
             </a:extLst>
           </p:cNvPr>
@@ -2428,7 +2428,7 @@
           <a:bodyPr/>
           <a:lstStyle/>
           <a:p>
-            <a:fld id="{A9ACF27C-ADDA-45C4-B6BB-F49BFBD5495D}" type="slidenum">
+            <a:fld id="{13D1B0FA-2E16-42A9-847B-D967D4F65B3B}" type="slidenum">
               <a:rPr lang="ko-KR" altLang="en-US" smtClean="0"/>
               <a:t>‹#›</a:t>
             </a:fld>
@@ -2439,7 +2439,7 @@
     </p:spTree>
     <p:extLst>
       <p:ext uri="{BB962C8B-B14F-4D97-AF65-F5344CB8AC3E}">
-        <p14:creationId xmlns:p14="http://schemas.microsoft.com/office/powerpoint/2010/main" val="2127109638"/>
+        <p14:creationId xmlns:p14="http://schemas.microsoft.com/office/powerpoint/2010/main" val="2258224016"/>
       </p:ext>
     </p:extLst>
   </p:cSld>
@@ -2471,7 +2471,7 @@
           <p:cNvPr id="2" name="제목 1">
             <a:extLst>
               <a:ext uri="{FF2B5EF4-FFF2-40B4-BE49-F238E27FC236}">
-                <a16:creationId xmlns:a16="http://schemas.microsoft.com/office/drawing/2014/main" id="{6DBC5D5B-79B3-AC3B-6EE6-DF8C5DDE6C2A}"/>
+                <a16:creationId xmlns:a16="http://schemas.microsoft.com/office/drawing/2014/main" id="{858CC80B-8565-795D-2FDA-D68A68A185CD}"/>
               </a:ext>
             </a:extLst>
           </p:cNvPr>
@@ -2508,7 +2508,7 @@
           <p:cNvPr id="3" name="그림 개체 틀 2">
             <a:extLst>
               <a:ext uri="{FF2B5EF4-FFF2-40B4-BE49-F238E27FC236}">
-                <a16:creationId xmlns:a16="http://schemas.microsoft.com/office/drawing/2014/main" id="{2E910C09-41BE-D55D-289C-ED084FBC7BAE}"/>
+                <a16:creationId xmlns:a16="http://schemas.microsoft.com/office/drawing/2014/main" id="{F3AF9EF1-043F-A737-BD29-C9CB04693667}"/>
               </a:ext>
             </a:extLst>
           </p:cNvPr>
@@ -2575,7 +2575,7 @@
           <p:cNvPr id="4" name="텍스트 개체 틀 3">
             <a:extLst>
               <a:ext uri="{FF2B5EF4-FFF2-40B4-BE49-F238E27FC236}">
-                <a16:creationId xmlns:a16="http://schemas.microsoft.com/office/drawing/2014/main" id="{000BBB52-265E-C99E-41A2-F84A72A41B0D}"/>
+                <a16:creationId xmlns:a16="http://schemas.microsoft.com/office/drawing/2014/main" id="{1CCDB607-CAC9-53E5-BD44-A56AB9FDA939}"/>
               </a:ext>
             </a:extLst>
           </p:cNvPr>
@@ -2646,7 +2646,7 @@
           <p:cNvPr id="5" name="날짜 개체 틀 4">
             <a:extLst>
               <a:ext uri="{FF2B5EF4-FFF2-40B4-BE49-F238E27FC236}">
-                <a16:creationId xmlns:a16="http://schemas.microsoft.com/office/drawing/2014/main" id="{63B2B773-B799-77BF-1B5E-05AD7B0C8312}"/>
+                <a16:creationId xmlns:a16="http://schemas.microsoft.com/office/drawing/2014/main" id="{711279BB-934B-946D-006E-99CB1002F279}"/>
               </a:ext>
             </a:extLst>
           </p:cNvPr>
@@ -2662,7 +2662,7 @@
           <a:bodyPr/>
           <a:lstStyle/>
           <a:p>
-            <a:fld id="{8F678A20-BC07-4238-8F42-C6B8C8EAA3E5}" type="datetimeFigureOut">
+            <a:fld id="{20C091FE-7301-4091-ADD6-67AD4FDA71E3}" type="datetimeFigureOut">
               <a:rPr lang="ko-KR" altLang="en-US" smtClean="0"/>
               <a:t>2023-04-16</a:t>
             </a:fld>
@@ -2675,7 +2675,7 @@
           <p:cNvPr id="6" name="바닥글 개체 틀 5">
             <a:extLst>
               <a:ext uri="{FF2B5EF4-FFF2-40B4-BE49-F238E27FC236}">
-                <a16:creationId xmlns:a16="http://schemas.microsoft.com/office/drawing/2014/main" id="{3C270A1D-8564-9882-9E2A-9D0A727971D2}"/>
+                <a16:creationId xmlns:a16="http://schemas.microsoft.com/office/drawing/2014/main" id="{2F5D718E-1489-909F-44A0-3DDC14BC001A}"/>
               </a:ext>
             </a:extLst>
           </p:cNvPr>
@@ -2700,7 +2700,7 @@
           <p:cNvPr id="7" name="슬라이드 번호 개체 틀 6">
             <a:extLst>
               <a:ext uri="{FF2B5EF4-FFF2-40B4-BE49-F238E27FC236}">
-                <a16:creationId xmlns:a16="http://schemas.microsoft.com/office/drawing/2014/main" id="{D06BAA2B-8C07-3476-820A-DBCAB62C0AA9}"/>
+                <a16:creationId xmlns:a16="http://schemas.microsoft.com/office/drawing/2014/main" id="{A6CEE111-273B-9AD7-E942-182C0528767B}"/>
               </a:ext>
             </a:extLst>
           </p:cNvPr>
@@ -2716,7 +2716,7 @@
           <a:bodyPr/>
           <a:lstStyle/>
           <a:p>
-            <a:fld id="{A9ACF27C-ADDA-45C4-B6BB-F49BFBD5495D}" type="slidenum">
+            <a:fld id="{13D1B0FA-2E16-42A9-847B-D967D4F65B3B}" type="slidenum">
               <a:rPr lang="ko-KR" altLang="en-US" smtClean="0"/>
               <a:t>‹#›</a:t>
             </a:fld>
@@ -2727,7 +2727,7 @@
     </p:spTree>
     <p:extLst>
       <p:ext uri="{BB962C8B-B14F-4D97-AF65-F5344CB8AC3E}">
-        <p14:creationId xmlns:p14="http://schemas.microsoft.com/office/powerpoint/2010/main" val="198709497"/>
+        <p14:creationId xmlns:p14="http://schemas.microsoft.com/office/powerpoint/2010/main" val="131847678"/>
       </p:ext>
     </p:extLst>
   </p:cSld>
@@ -2764,7 +2764,7 @@
           <p:cNvPr id="2" name="제목 개체 틀 1">
             <a:extLst>
               <a:ext uri="{FF2B5EF4-FFF2-40B4-BE49-F238E27FC236}">
-                <a16:creationId xmlns:a16="http://schemas.microsoft.com/office/drawing/2014/main" id="{3C2DF98A-6BE9-8868-329B-8D2DAF4F47BC}"/>
+                <a16:creationId xmlns:a16="http://schemas.microsoft.com/office/drawing/2014/main" id="{B9B1D541-6910-719A-ED53-68F232F211E0}"/>
               </a:ext>
             </a:extLst>
           </p:cNvPr>
@@ -2802,7 +2802,7 @@
           <p:cNvPr id="3" name="텍스트 개체 틀 2">
             <a:extLst>
               <a:ext uri="{FF2B5EF4-FFF2-40B4-BE49-F238E27FC236}">
-                <a16:creationId xmlns:a16="http://schemas.microsoft.com/office/drawing/2014/main" id="{69AD1949-3E97-6586-B9E5-146C1072B650}"/>
+                <a16:creationId xmlns:a16="http://schemas.microsoft.com/office/drawing/2014/main" id="{622474FF-7357-771D-6D7C-07C767709633}"/>
               </a:ext>
             </a:extLst>
           </p:cNvPr>
@@ -2869,7 +2869,7 @@
           <p:cNvPr id="4" name="날짜 개체 틀 3">
             <a:extLst>
               <a:ext uri="{FF2B5EF4-FFF2-40B4-BE49-F238E27FC236}">
-                <a16:creationId xmlns:a16="http://schemas.microsoft.com/office/drawing/2014/main" id="{B727A2AF-BA25-B18E-BAA0-EA48FD3A9323}"/>
+                <a16:creationId xmlns:a16="http://schemas.microsoft.com/office/drawing/2014/main" id="{464D5236-4CBB-6393-7DB7-08B21E6FBE7C}"/>
               </a:ext>
             </a:extLst>
           </p:cNvPr>
@@ -2903,7 +2903,7 @@
             </a:lvl1pPr>
           </a:lstStyle>
           <a:p>
-            <a:fld id="{8F678A20-BC07-4238-8F42-C6B8C8EAA3E5}" type="datetimeFigureOut">
+            <a:fld id="{20C091FE-7301-4091-ADD6-67AD4FDA71E3}" type="datetimeFigureOut">
               <a:rPr lang="ko-KR" altLang="en-US" smtClean="0"/>
               <a:t>2023-04-16</a:t>
             </a:fld>
@@ -2916,7 +2916,7 @@
           <p:cNvPr id="5" name="바닥글 개체 틀 4">
             <a:extLst>
               <a:ext uri="{FF2B5EF4-FFF2-40B4-BE49-F238E27FC236}">
-                <a16:creationId xmlns:a16="http://schemas.microsoft.com/office/drawing/2014/main" id="{0EE48A35-6620-3B85-922F-A99658418D5E}"/>
+                <a16:creationId xmlns:a16="http://schemas.microsoft.com/office/drawing/2014/main" id="{4BCD1918-ED04-B058-FA55-14DEB54576D7}"/>
               </a:ext>
             </a:extLst>
           </p:cNvPr>
@@ -2959,7 +2959,7 @@
           <p:cNvPr id="6" name="슬라이드 번호 개체 틀 5">
             <a:extLst>
               <a:ext uri="{FF2B5EF4-FFF2-40B4-BE49-F238E27FC236}">
-                <a16:creationId xmlns:a16="http://schemas.microsoft.com/office/drawing/2014/main" id="{E5D78448-80FC-26B6-734D-7465A02890B4}"/>
+                <a16:creationId xmlns:a16="http://schemas.microsoft.com/office/drawing/2014/main" id="{F1763444-0AA0-D24E-6683-5E1AE11677DA}"/>
               </a:ext>
             </a:extLst>
           </p:cNvPr>
@@ -2993,7 +2993,7 @@
             </a:lvl1pPr>
           </a:lstStyle>
           <a:p>
-            <a:fld id="{A9ACF27C-ADDA-45C4-B6BB-F49BFBD5495D}" type="slidenum">
+            <a:fld id="{13D1B0FA-2E16-42A9-847B-D967D4F65B3B}" type="slidenum">
               <a:rPr lang="ko-KR" altLang="en-US" smtClean="0"/>
               <a:t>‹#›</a:t>
             </a:fld>
@@ -3004,7 +3004,7 @@
     </p:spTree>
     <p:extLst>
       <p:ext uri="{BB962C8B-B14F-4D97-AF65-F5344CB8AC3E}">
-        <p14:creationId xmlns:p14="http://schemas.microsoft.com/office/powerpoint/2010/main" val="2650260018"/>
+        <p14:creationId xmlns:p14="http://schemas.microsoft.com/office/powerpoint/2010/main" val="2960936741"/>
       </p:ext>
     </p:extLst>
   </p:cSld>
@@ -3327,7 +3327,7 @@
           <p:cNvPr id="2" name="직사각형 1">
             <a:extLst>
               <a:ext uri="{FF2B5EF4-FFF2-40B4-BE49-F238E27FC236}">
-                <a16:creationId xmlns:a16="http://schemas.microsoft.com/office/drawing/2014/main" id="{3A777199-A8A6-DF3E-C3A5-359B5D441D84}"/>
+                <a16:creationId xmlns:a16="http://schemas.microsoft.com/office/drawing/2014/main" id="{85512D53-58D2-3C12-19C7-ECF7382DDDF7}"/>
               </a:ext>
             </a:extLst>
           </p:cNvPr>
@@ -3386,7 +3386,7 @@
           <p:cNvPr id="3" name="직선 연결선 2">
             <a:extLst>
               <a:ext uri="{FF2B5EF4-FFF2-40B4-BE49-F238E27FC236}">
-                <a16:creationId xmlns:a16="http://schemas.microsoft.com/office/drawing/2014/main" id="{57680613-8444-64E9-B48D-57E692039563}"/>
+                <a16:creationId xmlns:a16="http://schemas.microsoft.com/office/drawing/2014/main" id="{63007B3C-B4FF-2970-D5C8-D7265A50A7A3}"/>
               </a:ext>
             </a:extLst>
           </p:cNvPr>
@@ -3427,7 +3427,7 @@
           <p:cNvPr id="4" name="직사각형 3">
             <a:extLst>
               <a:ext uri="{FF2B5EF4-FFF2-40B4-BE49-F238E27FC236}">
-                <a16:creationId xmlns:a16="http://schemas.microsoft.com/office/drawing/2014/main" id="{7D8914FF-CCD1-02ED-5D5D-BCA67DA51380}"/>
+                <a16:creationId xmlns:a16="http://schemas.microsoft.com/office/drawing/2014/main" id="{6B06E46A-7357-B630-4C27-733F705DD9AB}"/>
               </a:ext>
             </a:extLst>
           </p:cNvPr>
@@ -3486,7 +3486,7 @@
           <p:cNvPr id="5" name="직선 연결선 4">
             <a:extLst>
               <a:ext uri="{FF2B5EF4-FFF2-40B4-BE49-F238E27FC236}">
-                <a16:creationId xmlns:a16="http://schemas.microsoft.com/office/drawing/2014/main" id="{4A9C4A4D-AD1B-DC12-CB74-3623BC920264}"/>
+                <a16:creationId xmlns:a16="http://schemas.microsoft.com/office/drawing/2014/main" id="{8CA25132-85DF-1178-D931-DC6A809C938E}"/>
               </a:ext>
             </a:extLst>
           </p:cNvPr>
@@ -3527,7 +3527,7 @@
           <p:cNvPr id="6" name="직사각형 5">
             <a:extLst>
               <a:ext uri="{FF2B5EF4-FFF2-40B4-BE49-F238E27FC236}">
-                <a16:creationId xmlns:a16="http://schemas.microsoft.com/office/drawing/2014/main" id="{F8BF56BC-D0A3-76C4-CD0C-4C52DA7324E5}"/>
+                <a16:creationId xmlns:a16="http://schemas.microsoft.com/office/drawing/2014/main" id="{C1DD5B55-1C16-993F-ED93-AC7BA4570C3A}"/>
               </a:ext>
             </a:extLst>
           </p:cNvPr>
@@ -3586,7 +3586,7 @@
           <p:cNvPr id="7" name="직선 연결선 6">
             <a:extLst>
               <a:ext uri="{FF2B5EF4-FFF2-40B4-BE49-F238E27FC236}">
-                <a16:creationId xmlns:a16="http://schemas.microsoft.com/office/drawing/2014/main" id="{E56D73B1-793F-79C5-39D3-038B4685CB3F}"/>
+                <a16:creationId xmlns:a16="http://schemas.microsoft.com/office/drawing/2014/main" id="{5E39FB52-64DB-4ADF-D42D-BD612AA40234}"/>
               </a:ext>
             </a:extLst>
           </p:cNvPr>
@@ -3627,7 +3627,7 @@
           <p:cNvPr id="8" name="직사각형 7">
             <a:extLst>
               <a:ext uri="{FF2B5EF4-FFF2-40B4-BE49-F238E27FC236}">
-                <a16:creationId xmlns:a16="http://schemas.microsoft.com/office/drawing/2014/main" id="{0C30DA90-DCB3-C98B-05A5-611EF0174D73}"/>
+                <a16:creationId xmlns:a16="http://schemas.microsoft.com/office/drawing/2014/main" id="{A8F633D9-2D8F-475F-E2E2-FCD41AAA9180}"/>
               </a:ext>
             </a:extLst>
           </p:cNvPr>
@@ -3686,7 +3686,7 @@
           <p:cNvPr id="9" name="직선 연결선 8">
             <a:extLst>
               <a:ext uri="{FF2B5EF4-FFF2-40B4-BE49-F238E27FC236}">
-                <a16:creationId xmlns:a16="http://schemas.microsoft.com/office/drawing/2014/main" id="{460D640E-5274-0569-33F0-9F670C69A275}"/>
+                <a16:creationId xmlns:a16="http://schemas.microsoft.com/office/drawing/2014/main" id="{2A165736-D95F-1065-9135-C372F42CACFD}"/>
               </a:ext>
             </a:extLst>
           </p:cNvPr>
@@ -3727,7 +3727,7 @@
           <p:cNvPr id="10" name="직사각형 9">
             <a:extLst>
               <a:ext uri="{FF2B5EF4-FFF2-40B4-BE49-F238E27FC236}">
-                <a16:creationId xmlns:a16="http://schemas.microsoft.com/office/drawing/2014/main" id="{243D5D70-8F39-6390-7AB3-2B1775E16ADB}"/>
+                <a16:creationId xmlns:a16="http://schemas.microsoft.com/office/drawing/2014/main" id="{7B139FFF-A661-1140-C6A6-AD82378C270E}"/>
               </a:ext>
             </a:extLst>
           </p:cNvPr>
@@ -3786,7 +3786,7 @@
           <p:cNvPr id="11" name="직선 연결선 10">
             <a:extLst>
               <a:ext uri="{FF2B5EF4-FFF2-40B4-BE49-F238E27FC236}">
-                <a16:creationId xmlns:a16="http://schemas.microsoft.com/office/drawing/2014/main" id="{B6A5C024-7AF7-9B16-05B1-85718257FF15}"/>
+                <a16:creationId xmlns:a16="http://schemas.microsoft.com/office/drawing/2014/main" id="{3AEBE3AE-284F-9D53-05D4-10D94E6BECAC}"/>
               </a:ext>
             </a:extLst>
           </p:cNvPr>
@@ -3827,7 +3827,7 @@
           <p:cNvPr id="12" name="직사각형 11">
             <a:extLst>
               <a:ext uri="{FF2B5EF4-FFF2-40B4-BE49-F238E27FC236}">
-                <a16:creationId xmlns:a16="http://schemas.microsoft.com/office/drawing/2014/main" id="{24DB505C-6155-4D35-EADF-280C38909F38}"/>
+                <a16:creationId xmlns:a16="http://schemas.microsoft.com/office/drawing/2014/main" id="{14E1FA9F-A5CA-24CC-4E4E-A8CB50930203}"/>
               </a:ext>
             </a:extLst>
           </p:cNvPr>
@@ -3886,7 +3886,7 @@
           <p:cNvPr id="13" name="직선 연결선 12">
             <a:extLst>
               <a:ext uri="{FF2B5EF4-FFF2-40B4-BE49-F238E27FC236}">
-                <a16:creationId xmlns:a16="http://schemas.microsoft.com/office/drawing/2014/main" id="{662F2E88-C225-2EAE-6E4B-DBF06AB48174}"/>
+                <a16:creationId xmlns:a16="http://schemas.microsoft.com/office/drawing/2014/main" id="{9BCC3D29-BE92-F5E5-C409-C5C721368B09}"/>
               </a:ext>
             </a:extLst>
           </p:cNvPr>
@@ -3927,7 +3927,7 @@
           <p:cNvPr id="14" name="직사각형 13">
             <a:extLst>
               <a:ext uri="{FF2B5EF4-FFF2-40B4-BE49-F238E27FC236}">
-                <a16:creationId xmlns:a16="http://schemas.microsoft.com/office/drawing/2014/main" id="{86582611-1A8E-9AA0-D992-E6823864ADF1}"/>
+                <a16:creationId xmlns:a16="http://schemas.microsoft.com/office/drawing/2014/main" id="{7FA88BF0-BE13-78EB-E412-63B2ACDFAC80}"/>
               </a:ext>
             </a:extLst>
           </p:cNvPr>
@@ -3986,7 +3986,7 @@
           <p:cNvPr id="15" name="직선 연결선 14">
             <a:extLst>
               <a:ext uri="{FF2B5EF4-FFF2-40B4-BE49-F238E27FC236}">
-                <a16:creationId xmlns:a16="http://schemas.microsoft.com/office/drawing/2014/main" id="{D04CA2F5-ACE8-4F9C-D87A-99CDF57D3AD8}"/>
+                <a16:creationId xmlns:a16="http://schemas.microsoft.com/office/drawing/2014/main" id="{74821246-5358-462D-173A-C5DB9B22E474}"/>
               </a:ext>
             </a:extLst>
           </p:cNvPr>
@@ -4027,7 +4027,7 @@
           <p:cNvPr id="16" name="직사각형 15">
             <a:extLst>
               <a:ext uri="{FF2B5EF4-FFF2-40B4-BE49-F238E27FC236}">
-                <a16:creationId xmlns:a16="http://schemas.microsoft.com/office/drawing/2014/main" id="{D6356628-5FC6-1A36-BB85-26C2E74ACA85}"/>
+                <a16:creationId xmlns:a16="http://schemas.microsoft.com/office/drawing/2014/main" id="{C9F90FFF-97A6-5D1D-0DF0-E46605E452D0}"/>
               </a:ext>
             </a:extLst>
           </p:cNvPr>
@@ -4086,7 +4086,7 @@
           <p:cNvPr id="17" name="직선 연결선 16">
             <a:extLst>
               <a:ext uri="{FF2B5EF4-FFF2-40B4-BE49-F238E27FC236}">
-                <a16:creationId xmlns:a16="http://schemas.microsoft.com/office/drawing/2014/main" id="{CE27F309-1B4A-C1D4-76BF-F4E9F3D9567B}"/>
+                <a16:creationId xmlns:a16="http://schemas.microsoft.com/office/drawing/2014/main" id="{0FD43007-E1C5-A04B-873F-F65C25B18BA9}"/>
               </a:ext>
             </a:extLst>
           </p:cNvPr>
@@ -4127,7 +4127,7 @@
           <p:cNvPr id="18" name="직사각형 17">
             <a:extLst>
               <a:ext uri="{FF2B5EF4-FFF2-40B4-BE49-F238E27FC236}">
-                <a16:creationId xmlns:a16="http://schemas.microsoft.com/office/drawing/2014/main" id="{5CAE2D31-E815-D423-A5AD-557346F374B8}"/>
+                <a16:creationId xmlns:a16="http://schemas.microsoft.com/office/drawing/2014/main" id="{C5B37F2E-A105-77CA-2D97-1E3B6B57CB71}"/>
               </a:ext>
             </a:extLst>
           </p:cNvPr>
@@ -4186,7 +4186,7 @@
           <p:cNvPr id="19" name="직선 연결선 18">
             <a:extLst>
               <a:ext uri="{FF2B5EF4-FFF2-40B4-BE49-F238E27FC236}">
-                <a16:creationId xmlns:a16="http://schemas.microsoft.com/office/drawing/2014/main" id="{6BBA5CDE-3B1C-B369-7DF0-D5C5F2C9119A}"/>
+                <a16:creationId xmlns:a16="http://schemas.microsoft.com/office/drawing/2014/main" id="{4FE0DCE3-14F7-5DF3-19BB-B504A5305558}"/>
               </a:ext>
             </a:extLst>
           </p:cNvPr>
@@ -4227,7 +4227,7 @@
           <p:cNvPr id="20" name="직사각형 19">
             <a:extLst>
               <a:ext uri="{FF2B5EF4-FFF2-40B4-BE49-F238E27FC236}">
-                <a16:creationId xmlns:a16="http://schemas.microsoft.com/office/drawing/2014/main" id="{178DB6E7-004C-E542-1250-0379A62147B6}"/>
+                <a16:creationId xmlns:a16="http://schemas.microsoft.com/office/drawing/2014/main" id="{3FC02C31-705B-D4B0-3997-B17FDB791090}"/>
               </a:ext>
             </a:extLst>
           </p:cNvPr>
@@ -4286,7 +4286,7 @@
           <p:cNvPr id="21" name="직선 연결선 20">
             <a:extLst>
               <a:ext uri="{FF2B5EF4-FFF2-40B4-BE49-F238E27FC236}">
-                <a16:creationId xmlns:a16="http://schemas.microsoft.com/office/drawing/2014/main" id="{569DF147-8E44-37D8-5118-F5FF91A049A2}"/>
+                <a16:creationId xmlns:a16="http://schemas.microsoft.com/office/drawing/2014/main" id="{16334242-A367-AA10-5EF7-FF3ABBE72166}"/>
               </a:ext>
             </a:extLst>
           </p:cNvPr>
@@ -4327,7 +4327,7 @@
           <p:cNvPr id="22" name="직사각형 21">
             <a:extLst>
               <a:ext uri="{FF2B5EF4-FFF2-40B4-BE49-F238E27FC236}">
-                <a16:creationId xmlns:a16="http://schemas.microsoft.com/office/drawing/2014/main" id="{4FFFB7B3-1BB5-5483-F57A-513B7C524078}"/>
+                <a16:creationId xmlns:a16="http://schemas.microsoft.com/office/drawing/2014/main" id="{A0C5FC71-9069-B585-BCD2-B1F2CD6DC5DB}"/>
               </a:ext>
             </a:extLst>
           </p:cNvPr>
@@ -4388,7 +4388,7 @@
           <p:cNvPr id="23" name="직선 연결선 22">
             <a:extLst>
               <a:ext uri="{FF2B5EF4-FFF2-40B4-BE49-F238E27FC236}">
-                <a16:creationId xmlns:a16="http://schemas.microsoft.com/office/drawing/2014/main" id="{D1DA01CE-2F17-6358-909A-7A43E5B82A0E}"/>
+                <a16:creationId xmlns:a16="http://schemas.microsoft.com/office/drawing/2014/main" id="{67AEB58E-0745-BBF9-EAB4-D92356BB4A68}"/>
               </a:ext>
             </a:extLst>
           </p:cNvPr>
@@ -4430,7 +4430,7 @@
           <p:cNvPr id="24" name="직사각형 23">
             <a:extLst>
               <a:ext uri="{FF2B5EF4-FFF2-40B4-BE49-F238E27FC236}">
-                <a16:creationId xmlns:a16="http://schemas.microsoft.com/office/drawing/2014/main" id="{C1963263-F93D-CE69-5BA0-40333D6996F7}"/>
+                <a16:creationId xmlns:a16="http://schemas.microsoft.com/office/drawing/2014/main" id="{9741403F-5C7D-B83D-2356-68072670CB2D}"/>
               </a:ext>
             </a:extLst>
           </p:cNvPr>
@@ -4491,7 +4491,7 @@
           <p:cNvPr id="25" name="직선 연결선 24">
             <a:extLst>
               <a:ext uri="{FF2B5EF4-FFF2-40B4-BE49-F238E27FC236}">
-                <a16:creationId xmlns:a16="http://schemas.microsoft.com/office/drawing/2014/main" id="{6E1CB97D-3A06-60AC-B592-C7F3114EF3C1}"/>
+                <a16:creationId xmlns:a16="http://schemas.microsoft.com/office/drawing/2014/main" id="{15B3D62E-821B-A7E2-192E-14EEEF807222}"/>
               </a:ext>
             </a:extLst>
           </p:cNvPr>
@@ -4533,7 +4533,7 @@
           <p:cNvPr id="26" name="직사각형 25">
             <a:extLst>
               <a:ext uri="{FF2B5EF4-FFF2-40B4-BE49-F238E27FC236}">
-                <a16:creationId xmlns:a16="http://schemas.microsoft.com/office/drawing/2014/main" id="{4AEFE6CF-CD80-5056-2E41-1D9C566C9503}"/>
+                <a16:creationId xmlns:a16="http://schemas.microsoft.com/office/drawing/2014/main" id="{7AE86845-1785-EFBB-ECA8-2542F9E06B4D}"/>
               </a:ext>
             </a:extLst>
           </p:cNvPr>
@@ -4594,7 +4594,7 @@
           <p:cNvPr id="27" name="직선 연결선 26">
             <a:extLst>
               <a:ext uri="{FF2B5EF4-FFF2-40B4-BE49-F238E27FC236}">
-                <a16:creationId xmlns:a16="http://schemas.microsoft.com/office/drawing/2014/main" id="{F30B4D1D-A6D7-8332-9DD5-9EB224C7AF8C}"/>
+                <a16:creationId xmlns:a16="http://schemas.microsoft.com/office/drawing/2014/main" id="{8ECCEE3B-F825-EA9A-489E-EA5DDEADED53}"/>
               </a:ext>
             </a:extLst>
           </p:cNvPr>
@@ -4636,7 +4636,7 @@
           <p:cNvPr id="28" name="직사각형 27">
             <a:extLst>
               <a:ext uri="{FF2B5EF4-FFF2-40B4-BE49-F238E27FC236}">
-                <a16:creationId xmlns:a16="http://schemas.microsoft.com/office/drawing/2014/main" id="{10E6C787-8519-824E-34D8-35334CF2DEE4}"/>
+                <a16:creationId xmlns:a16="http://schemas.microsoft.com/office/drawing/2014/main" id="{3B444355-E9B2-7BF1-1ADD-8762D068D1C7}"/>
               </a:ext>
             </a:extLst>
           </p:cNvPr>
@@ -4697,7 +4697,7 @@
           <p:cNvPr id="29" name="직선 연결선 28">
             <a:extLst>
               <a:ext uri="{FF2B5EF4-FFF2-40B4-BE49-F238E27FC236}">
-                <a16:creationId xmlns:a16="http://schemas.microsoft.com/office/drawing/2014/main" id="{A0689A64-7DD4-A477-9F64-5E914E219964}"/>
+                <a16:creationId xmlns:a16="http://schemas.microsoft.com/office/drawing/2014/main" id="{C7586E82-01FD-F2C1-6925-99356655D8E6}"/>
               </a:ext>
             </a:extLst>
           </p:cNvPr>
@@ -4739,7 +4739,7 @@
           <p:cNvPr id="30" name="직사각형 29">
             <a:extLst>
               <a:ext uri="{FF2B5EF4-FFF2-40B4-BE49-F238E27FC236}">
-                <a16:creationId xmlns:a16="http://schemas.microsoft.com/office/drawing/2014/main" id="{37624915-8579-B03D-57DD-E3CB42DCCA55}"/>
+                <a16:creationId xmlns:a16="http://schemas.microsoft.com/office/drawing/2014/main" id="{30E8A0E2-0B44-EFE0-7676-01B5B7D52F6D}"/>
               </a:ext>
             </a:extLst>
           </p:cNvPr>
@@ -4800,7 +4800,7 @@
           <p:cNvPr id="31" name="직선 연결선 30">
             <a:extLst>
               <a:ext uri="{FF2B5EF4-FFF2-40B4-BE49-F238E27FC236}">
-                <a16:creationId xmlns:a16="http://schemas.microsoft.com/office/drawing/2014/main" id="{6DF54F1C-B932-36C0-CE7F-6313FCD5B97F}"/>
+                <a16:creationId xmlns:a16="http://schemas.microsoft.com/office/drawing/2014/main" id="{11F14D8A-A893-11FA-A35A-FE93D92D49A0}"/>
               </a:ext>
             </a:extLst>
           </p:cNvPr>
@@ -4842,7 +4842,7 @@
           <p:cNvPr id="32" name="직사각형 31">
             <a:extLst>
               <a:ext uri="{FF2B5EF4-FFF2-40B4-BE49-F238E27FC236}">
-                <a16:creationId xmlns:a16="http://schemas.microsoft.com/office/drawing/2014/main" id="{97940371-12F0-5B12-9133-61FD07C52F2F}"/>
+                <a16:creationId xmlns:a16="http://schemas.microsoft.com/office/drawing/2014/main" id="{C58E27BC-468E-D7B2-A53A-3343CED68472}"/>
               </a:ext>
             </a:extLst>
           </p:cNvPr>
@@ -4903,7 +4903,7 @@
           <p:cNvPr id="33" name="직선 연결선 32">
             <a:extLst>
               <a:ext uri="{FF2B5EF4-FFF2-40B4-BE49-F238E27FC236}">
-                <a16:creationId xmlns:a16="http://schemas.microsoft.com/office/drawing/2014/main" id="{94CAEA56-3568-C38A-CAB6-5609F3E80AF0}"/>
+                <a16:creationId xmlns:a16="http://schemas.microsoft.com/office/drawing/2014/main" id="{C8A9705C-459D-1040-EC92-4E8C101C0CF1}"/>
               </a:ext>
             </a:extLst>
           </p:cNvPr>
@@ -4945,7 +4945,7 @@
           <p:cNvPr id="34" name="직사각형 33">
             <a:extLst>
               <a:ext uri="{FF2B5EF4-FFF2-40B4-BE49-F238E27FC236}">
-                <a16:creationId xmlns:a16="http://schemas.microsoft.com/office/drawing/2014/main" id="{23B7B3D0-1B63-F2B2-B9DD-F48076CF5301}"/>
+                <a16:creationId xmlns:a16="http://schemas.microsoft.com/office/drawing/2014/main" id="{C0FE653C-8EA3-9E07-1424-A5ADCE821808}"/>
               </a:ext>
             </a:extLst>
           </p:cNvPr>
@@ -5006,7 +5006,7 @@
           <p:cNvPr id="35" name="직선 연결선 34">
             <a:extLst>
               <a:ext uri="{FF2B5EF4-FFF2-40B4-BE49-F238E27FC236}">
-                <a16:creationId xmlns:a16="http://schemas.microsoft.com/office/drawing/2014/main" id="{CF38CD7C-2558-B442-B267-AB692DF20764}"/>
+                <a16:creationId xmlns:a16="http://schemas.microsoft.com/office/drawing/2014/main" id="{3AB68EC0-2744-5E8E-10CD-C51D04BEC06E}"/>
               </a:ext>
             </a:extLst>
           </p:cNvPr>
@@ -5048,7 +5048,7 @@
           <p:cNvPr id="36" name="직사각형 35">
             <a:extLst>
               <a:ext uri="{FF2B5EF4-FFF2-40B4-BE49-F238E27FC236}">
-                <a16:creationId xmlns:a16="http://schemas.microsoft.com/office/drawing/2014/main" id="{7F121D43-9A0B-0DCE-0A53-D11D07E021F0}"/>
+                <a16:creationId xmlns:a16="http://schemas.microsoft.com/office/drawing/2014/main" id="{3FEDB8F3-D94D-3A93-F2EE-D486C76E3734}"/>
               </a:ext>
             </a:extLst>
           </p:cNvPr>
@@ -5109,7 +5109,7 @@
           <p:cNvPr id="37" name="직선 연결선 36">
             <a:extLst>
               <a:ext uri="{FF2B5EF4-FFF2-40B4-BE49-F238E27FC236}">
-                <a16:creationId xmlns:a16="http://schemas.microsoft.com/office/drawing/2014/main" id="{233422F7-2C8C-AB6C-5057-6678FADEFA7A}"/>
+                <a16:creationId xmlns:a16="http://schemas.microsoft.com/office/drawing/2014/main" id="{488A0644-DF96-ACC4-C8F2-8D7E90C6F11A}"/>
               </a:ext>
             </a:extLst>
           </p:cNvPr>
@@ -5151,7 +5151,7 @@
           <p:cNvPr id="38" name="직사각형 37">
             <a:extLst>
               <a:ext uri="{FF2B5EF4-FFF2-40B4-BE49-F238E27FC236}">
-                <a16:creationId xmlns:a16="http://schemas.microsoft.com/office/drawing/2014/main" id="{4A0BEC68-EBE0-CF29-E0BD-FEFC414C2D13}"/>
+                <a16:creationId xmlns:a16="http://schemas.microsoft.com/office/drawing/2014/main" id="{A8AEBD63-5DCB-E334-D5A8-A820E7DC78C0}"/>
               </a:ext>
             </a:extLst>
           </p:cNvPr>
@@ -5212,7 +5212,7 @@
           <p:cNvPr id="39" name="직선 연결선 38">
             <a:extLst>
               <a:ext uri="{FF2B5EF4-FFF2-40B4-BE49-F238E27FC236}">
-                <a16:creationId xmlns:a16="http://schemas.microsoft.com/office/drawing/2014/main" id="{F9214F21-B158-5B83-AD80-15785A2F82D8}"/>
+                <a16:creationId xmlns:a16="http://schemas.microsoft.com/office/drawing/2014/main" id="{DBDD36C4-568B-E887-2930-8E8191A2C938}"/>
               </a:ext>
             </a:extLst>
           </p:cNvPr>
@@ -5254,7 +5254,7 @@
           <p:cNvPr id="40" name="직사각형 39">
             <a:extLst>
               <a:ext uri="{FF2B5EF4-FFF2-40B4-BE49-F238E27FC236}">
-                <a16:creationId xmlns:a16="http://schemas.microsoft.com/office/drawing/2014/main" id="{CF9C36FF-D859-8413-9388-C53B7702CAA8}"/>
+                <a16:creationId xmlns:a16="http://schemas.microsoft.com/office/drawing/2014/main" id="{EC3D0C2C-4735-8A2D-CC4F-7DC2A1B82D75}"/>
               </a:ext>
             </a:extLst>
           </p:cNvPr>
@@ -5315,7 +5315,7 @@
           <p:cNvPr id="41" name="직선 연결선 40">
             <a:extLst>
               <a:ext uri="{FF2B5EF4-FFF2-40B4-BE49-F238E27FC236}">
-                <a16:creationId xmlns:a16="http://schemas.microsoft.com/office/drawing/2014/main" id="{37193E4C-5083-1DFB-40F2-2818B089C077}"/>
+                <a16:creationId xmlns:a16="http://schemas.microsoft.com/office/drawing/2014/main" id="{434E4C2C-F8A4-42A7-5AAB-06C7A95BE0C9}"/>
               </a:ext>
             </a:extLst>
           </p:cNvPr>
@@ -5357,7 +5357,7 @@
           <p:cNvPr id="42" name="직사각형 41">
             <a:extLst>
               <a:ext uri="{FF2B5EF4-FFF2-40B4-BE49-F238E27FC236}">
-                <a16:creationId xmlns:a16="http://schemas.microsoft.com/office/drawing/2014/main" id="{4D439BFE-917D-1073-40E4-3D4CBDF998EB}"/>
+                <a16:creationId xmlns:a16="http://schemas.microsoft.com/office/drawing/2014/main" id="{B3627058-A7C1-5962-DCB1-8C8D2B0B56A4}"/>
               </a:ext>
             </a:extLst>
           </p:cNvPr>
@@ -5418,7 +5418,7 @@
           <p:cNvPr id="43" name="직선 연결선 42">
             <a:extLst>
               <a:ext uri="{FF2B5EF4-FFF2-40B4-BE49-F238E27FC236}">
-                <a16:creationId xmlns:a16="http://schemas.microsoft.com/office/drawing/2014/main" id="{A8421D73-D170-55A8-9D0E-C0476376776C}"/>
+                <a16:creationId xmlns:a16="http://schemas.microsoft.com/office/drawing/2014/main" id="{85ACF60C-227D-ACA4-48BC-89548D8D78BB}"/>
               </a:ext>
             </a:extLst>
           </p:cNvPr>
@@ -5460,7 +5460,7 @@
           <p:cNvPr id="44" name="직사각형 43">
             <a:extLst>
               <a:ext uri="{FF2B5EF4-FFF2-40B4-BE49-F238E27FC236}">
-                <a16:creationId xmlns:a16="http://schemas.microsoft.com/office/drawing/2014/main" id="{8028DF93-10B8-312E-FDAC-7D41198F2210}"/>
+                <a16:creationId xmlns:a16="http://schemas.microsoft.com/office/drawing/2014/main" id="{D5880A65-C3C2-A309-B43B-03BE15CC1CDD}"/>
               </a:ext>
             </a:extLst>
           </p:cNvPr>
@@ -5521,7 +5521,7 @@
           <p:cNvPr id="45" name="직선 연결선 44">
             <a:extLst>
               <a:ext uri="{FF2B5EF4-FFF2-40B4-BE49-F238E27FC236}">
-                <a16:creationId xmlns:a16="http://schemas.microsoft.com/office/drawing/2014/main" id="{9DE9DE8E-5C93-8ED2-4641-5F3BDDB39D3D}"/>
+                <a16:creationId xmlns:a16="http://schemas.microsoft.com/office/drawing/2014/main" id="{4219BE0F-10B7-472D-2C67-DCCAABD7BADB}"/>
               </a:ext>
             </a:extLst>
           </p:cNvPr>
@@ -5563,7 +5563,7 @@
           <p:cNvPr id="46" name="직사각형 45">
             <a:extLst>
               <a:ext uri="{FF2B5EF4-FFF2-40B4-BE49-F238E27FC236}">
-                <a16:creationId xmlns:a16="http://schemas.microsoft.com/office/drawing/2014/main" id="{3DBF58E0-3284-2D1D-8A44-D0D7C07582DC}"/>
+                <a16:creationId xmlns:a16="http://schemas.microsoft.com/office/drawing/2014/main" id="{9E2A1FFC-0EF6-566F-2ABF-205C972E47B8}"/>
               </a:ext>
             </a:extLst>
           </p:cNvPr>
@@ -5624,7 +5624,7 @@
           <p:cNvPr id="47" name="직선 연결선 46">
             <a:extLst>
               <a:ext uri="{FF2B5EF4-FFF2-40B4-BE49-F238E27FC236}">
-                <a16:creationId xmlns:a16="http://schemas.microsoft.com/office/drawing/2014/main" id="{65AECD4A-178B-9A35-F459-CE18ED3DB71A}"/>
+                <a16:creationId xmlns:a16="http://schemas.microsoft.com/office/drawing/2014/main" id="{BBDF9CE0-FFF0-5759-AC6A-DB82BA5F4B42}"/>
               </a:ext>
             </a:extLst>
           </p:cNvPr>
@@ -5666,7 +5666,7 @@
           <p:cNvPr id="48" name="직사각형 47">
             <a:extLst>
               <a:ext uri="{FF2B5EF4-FFF2-40B4-BE49-F238E27FC236}">
-                <a16:creationId xmlns:a16="http://schemas.microsoft.com/office/drawing/2014/main" id="{4CCE7F92-DFC1-4F71-0FB3-32759EBC108C}"/>
+                <a16:creationId xmlns:a16="http://schemas.microsoft.com/office/drawing/2014/main" id="{8C55835A-2395-DD89-F4A5-DA710AA8C074}"/>
               </a:ext>
             </a:extLst>
           </p:cNvPr>
@@ -5727,7 +5727,7 @@
           <p:cNvPr id="49" name="직선 연결선 48">
             <a:extLst>
               <a:ext uri="{FF2B5EF4-FFF2-40B4-BE49-F238E27FC236}">
-                <a16:creationId xmlns:a16="http://schemas.microsoft.com/office/drawing/2014/main" id="{0441DAEA-E7EC-7787-7F20-2FE0AE4FFF3D}"/>
+                <a16:creationId xmlns:a16="http://schemas.microsoft.com/office/drawing/2014/main" id="{F172991A-C297-BE12-FE7C-23F45BD7CD59}"/>
               </a:ext>
             </a:extLst>
           </p:cNvPr>
@@ -5769,7 +5769,7 @@
           <p:cNvPr id="50" name="직사각형 49">
             <a:extLst>
               <a:ext uri="{FF2B5EF4-FFF2-40B4-BE49-F238E27FC236}">
-                <a16:creationId xmlns:a16="http://schemas.microsoft.com/office/drawing/2014/main" id="{4460DFFA-02F5-6069-8052-D9CF3616D605}"/>
+                <a16:creationId xmlns:a16="http://schemas.microsoft.com/office/drawing/2014/main" id="{38FB7D6F-33E1-FE6C-B28F-079456AE3AA6}"/>
               </a:ext>
             </a:extLst>
           </p:cNvPr>
@@ -5830,7 +5830,7 @@
           <p:cNvPr id="51" name="직선 연결선 50">
             <a:extLst>
               <a:ext uri="{FF2B5EF4-FFF2-40B4-BE49-F238E27FC236}">
-                <a16:creationId xmlns:a16="http://schemas.microsoft.com/office/drawing/2014/main" id="{D272C0F3-C633-B75D-CEA4-15DF7B44501B}"/>
+                <a16:creationId xmlns:a16="http://schemas.microsoft.com/office/drawing/2014/main" id="{91D042BA-03E9-21BB-4EF5-B934DE29C277}"/>
               </a:ext>
             </a:extLst>
           </p:cNvPr>
@@ -5872,7 +5872,7 @@
           <p:cNvPr id="52" name="직사각형 51">
             <a:extLst>
               <a:ext uri="{FF2B5EF4-FFF2-40B4-BE49-F238E27FC236}">
-                <a16:creationId xmlns:a16="http://schemas.microsoft.com/office/drawing/2014/main" id="{DB8B47F1-E8AB-BF82-6377-7458D2040F0D}"/>
+                <a16:creationId xmlns:a16="http://schemas.microsoft.com/office/drawing/2014/main" id="{7D90663F-B7A3-696A-B9DE-CAF9FDFF2C68}"/>
               </a:ext>
             </a:extLst>
           </p:cNvPr>
@@ -5933,7 +5933,7 @@
           <p:cNvPr id="53" name="직선 연결선 52">
             <a:extLst>
               <a:ext uri="{FF2B5EF4-FFF2-40B4-BE49-F238E27FC236}">
-                <a16:creationId xmlns:a16="http://schemas.microsoft.com/office/drawing/2014/main" id="{0BEE630A-D463-F711-D5F0-596FA7E05831}"/>
+                <a16:creationId xmlns:a16="http://schemas.microsoft.com/office/drawing/2014/main" id="{273CAE05-2B57-581B-F96B-3766F4C7164D}"/>
               </a:ext>
             </a:extLst>
           </p:cNvPr>
@@ -5975,7 +5975,7 @@
           <p:cNvPr id="54" name="직사각형 53">
             <a:extLst>
               <a:ext uri="{FF2B5EF4-FFF2-40B4-BE49-F238E27FC236}">
-                <a16:creationId xmlns:a16="http://schemas.microsoft.com/office/drawing/2014/main" id="{4BA7392B-608C-1A82-5AE9-D5EC765E082F}"/>
+                <a16:creationId xmlns:a16="http://schemas.microsoft.com/office/drawing/2014/main" id="{4531776B-A671-7BD2-BB73-5B914FBEE68E}"/>
               </a:ext>
             </a:extLst>
           </p:cNvPr>
@@ -6036,7 +6036,7 @@
           <p:cNvPr id="55" name="직선 연결선 54">
             <a:extLst>
               <a:ext uri="{FF2B5EF4-FFF2-40B4-BE49-F238E27FC236}">
-                <a16:creationId xmlns:a16="http://schemas.microsoft.com/office/drawing/2014/main" id="{52118898-1B90-52F7-0A2C-97832B6C7881}"/>
+                <a16:creationId xmlns:a16="http://schemas.microsoft.com/office/drawing/2014/main" id="{B2CFB603-9B6B-E9BE-9B2D-A2C6E44CD702}"/>
               </a:ext>
             </a:extLst>
           </p:cNvPr>
@@ -6078,7 +6078,7 @@
           <p:cNvPr id="56" name="직사각형 55">
             <a:extLst>
               <a:ext uri="{FF2B5EF4-FFF2-40B4-BE49-F238E27FC236}">
-                <a16:creationId xmlns:a16="http://schemas.microsoft.com/office/drawing/2014/main" id="{37A69BB7-12F9-38E1-6940-6A8EA0045082}"/>
+                <a16:creationId xmlns:a16="http://schemas.microsoft.com/office/drawing/2014/main" id="{5C4BF171-FD1F-052E-A445-85231014D500}"/>
               </a:ext>
             </a:extLst>
           </p:cNvPr>
@@ -6139,7 +6139,7 @@
           <p:cNvPr id="57" name="직선 연결선 56">
             <a:extLst>
               <a:ext uri="{FF2B5EF4-FFF2-40B4-BE49-F238E27FC236}">
-                <a16:creationId xmlns:a16="http://schemas.microsoft.com/office/drawing/2014/main" id="{9FD0E3CA-BCFD-2CDF-2766-EF87DDD8895D}"/>
+                <a16:creationId xmlns:a16="http://schemas.microsoft.com/office/drawing/2014/main" id="{FCCE779E-B946-7B42-BEAA-11C6BD86F21D}"/>
               </a:ext>
             </a:extLst>
           </p:cNvPr>
@@ -6181,7 +6181,7 @@
           <p:cNvPr id="58" name="직사각형 57">
             <a:extLst>
               <a:ext uri="{FF2B5EF4-FFF2-40B4-BE49-F238E27FC236}">
-                <a16:creationId xmlns:a16="http://schemas.microsoft.com/office/drawing/2014/main" id="{BC5E1546-652C-0FCA-60BD-AFC06503C9F9}"/>
+                <a16:creationId xmlns:a16="http://schemas.microsoft.com/office/drawing/2014/main" id="{1905CFF2-023D-99EA-3A94-1067CCA0BF21}"/>
               </a:ext>
             </a:extLst>
           </p:cNvPr>
@@ -6242,7 +6242,7 @@
           <p:cNvPr id="59" name="직선 연결선 58">
             <a:extLst>
               <a:ext uri="{FF2B5EF4-FFF2-40B4-BE49-F238E27FC236}">
-                <a16:creationId xmlns:a16="http://schemas.microsoft.com/office/drawing/2014/main" id="{6E382971-21A2-2BEC-B62F-E97616A6D8CA}"/>
+                <a16:creationId xmlns:a16="http://schemas.microsoft.com/office/drawing/2014/main" id="{035CEF08-5E3F-FD10-A751-7D183AE8C789}"/>
               </a:ext>
             </a:extLst>
           </p:cNvPr>
@@ -6284,7 +6284,7 @@
           <p:cNvPr id="60" name="직사각형 59">
             <a:extLst>
               <a:ext uri="{FF2B5EF4-FFF2-40B4-BE49-F238E27FC236}">
-                <a16:creationId xmlns:a16="http://schemas.microsoft.com/office/drawing/2014/main" id="{A1B93466-EA30-A43C-34A1-8C57C469F95B}"/>
+                <a16:creationId xmlns:a16="http://schemas.microsoft.com/office/drawing/2014/main" id="{D4AD04E4-697B-569D-3D7B-86A30BF0B3B1}"/>
               </a:ext>
             </a:extLst>
           </p:cNvPr>
@@ -6345,7 +6345,7 @@
           <p:cNvPr id="61" name="직선 연결선 60">
             <a:extLst>
               <a:ext uri="{FF2B5EF4-FFF2-40B4-BE49-F238E27FC236}">
-                <a16:creationId xmlns:a16="http://schemas.microsoft.com/office/drawing/2014/main" id="{9C80E546-F093-EF9C-94E5-2364D3C1DCEB}"/>
+                <a16:creationId xmlns:a16="http://schemas.microsoft.com/office/drawing/2014/main" id="{D331C538-DE0F-DE05-11D2-3BACB941EFEF}"/>
               </a:ext>
             </a:extLst>
           </p:cNvPr>
@@ -6385,7 +6385,7 @@
     </p:spTree>
     <p:extLst>
       <p:ext uri="{BB962C8B-B14F-4D97-AF65-F5344CB8AC3E}">
-        <p14:creationId xmlns:p14="http://schemas.microsoft.com/office/powerpoint/2010/main" val="3213002100"/>
+        <p14:creationId xmlns:p14="http://schemas.microsoft.com/office/powerpoint/2010/main" val="583196860"/>
       </p:ext>
     </p:extLst>
   </p:cSld>
@@ -6417,7 +6417,7 @@
           <p:cNvPr id="2" name="직사각형 1">
             <a:extLst>
               <a:ext uri="{FF2B5EF4-FFF2-40B4-BE49-F238E27FC236}">
-                <a16:creationId xmlns:a16="http://schemas.microsoft.com/office/drawing/2014/main" id="{98B8EF97-26B2-2042-A577-285EBFC929E5}"/>
+                <a16:creationId xmlns:a16="http://schemas.microsoft.com/office/drawing/2014/main" id="{4766DAED-2EEA-2FA5-6A67-E49E0B97B2CD}"/>
               </a:ext>
             </a:extLst>
           </p:cNvPr>
@@ -6476,7 +6476,7 @@
           <p:cNvPr id="3" name="직선 연결선 2">
             <a:extLst>
               <a:ext uri="{FF2B5EF4-FFF2-40B4-BE49-F238E27FC236}">
-                <a16:creationId xmlns:a16="http://schemas.microsoft.com/office/drawing/2014/main" id="{6FB8F5F6-20B1-E260-FE5E-9F7DB1453E04}"/>
+                <a16:creationId xmlns:a16="http://schemas.microsoft.com/office/drawing/2014/main" id="{B357196B-C0CF-42E4-1B94-E2AE416132C8}"/>
               </a:ext>
             </a:extLst>
           </p:cNvPr>
@@ -6517,7 +6517,7 @@
           <p:cNvPr id="4" name="직사각형 3">
             <a:extLst>
               <a:ext uri="{FF2B5EF4-FFF2-40B4-BE49-F238E27FC236}">
-                <a16:creationId xmlns:a16="http://schemas.microsoft.com/office/drawing/2014/main" id="{1C9833CC-4D93-FE6F-229B-6928C4812BCA}"/>
+                <a16:creationId xmlns:a16="http://schemas.microsoft.com/office/drawing/2014/main" id="{71B286B5-3A8A-3816-6F3D-497DF642173A}"/>
               </a:ext>
             </a:extLst>
           </p:cNvPr>
@@ -6576,7 +6576,7 @@
           <p:cNvPr id="5" name="직선 연결선 4">
             <a:extLst>
               <a:ext uri="{FF2B5EF4-FFF2-40B4-BE49-F238E27FC236}">
-                <a16:creationId xmlns:a16="http://schemas.microsoft.com/office/drawing/2014/main" id="{7C4CCB78-98E4-5BF0-A357-50516B5FFCAA}"/>
+                <a16:creationId xmlns:a16="http://schemas.microsoft.com/office/drawing/2014/main" id="{CF5AA3C2-BE29-9924-55BB-544C9A2D2346}"/>
               </a:ext>
             </a:extLst>
           </p:cNvPr>
@@ -6617,7 +6617,7 @@
           <p:cNvPr id="6" name="직사각형 5">
             <a:extLst>
               <a:ext uri="{FF2B5EF4-FFF2-40B4-BE49-F238E27FC236}">
-                <a16:creationId xmlns:a16="http://schemas.microsoft.com/office/drawing/2014/main" id="{5089D5F5-4FF4-4F7C-A5B5-3F8B8DCED392}"/>
+                <a16:creationId xmlns:a16="http://schemas.microsoft.com/office/drawing/2014/main" id="{E88430D3-EEF5-2D84-813B-FD2ACB7D4C47}"/>
               </a:ext>
             </a:extLst>
           </p:cNvPr>
@@ -6676,7 +6676,7 @@
           <p:cNvPr id="7" name="직선 연결선 6">
             <a:extLst>
               <a:ext uri="{FF2B5EF4-FFF2-40B4-BE49-F238E27FC236}">
-                <a16:creationId xmlns:a16="http://schemas.microsoft.com/office/drawing/2014/main" id="{EA45B401-E603-FE34-EDD3-361D4ACB57BD}"/>
+                <a16:creationId xmlns:a16="http://schemas.microsoft.com/office/drawing/2014/main" id="{700B6519-BC04-67D5-2B5A-3F268C75E89C}"/>
               </a:ext>
             </a:extLst>
           </p:cNvPr>
@@ -6717,7 +6717,7 @@
           <p:cNvPr id="8" name="직사각형 7">
             <a:extLst>
               <a:ext uri="{FF2B5EF4-FFF2-40B4-BE49-F238E27FC236}">
-                <a16:creationId xmlns:a16="http://schemas.microsoft.com/office/drawing/2014/main" id="{7C48D560-D1B6-7721-64A7-F3CC407BEEB0}"/>
+                <a16:creationId xmlns:a16="http://schemas.microsoft.com/office/drawing/2014/main" id="{9EB0B982-49EE-6A3F-0E9D-1A2D99A73EB6}"/>
               </a:ext>
             </a:extLst>
           </p:cNvPr>
@@ -6776,7 +6776,7 @@
           <p:cNvPr id="9" name="직선 연결선 8">
             <a:extLst>
               <a:ext uri="{FF2B5EF4-FFF2-40B4-BE49-F238E27FC236}">
-                <a16:creationId xmlns:a16="http://schemas.microsoft.com/office/drawing/2014/main" id="{C9EFCC18-9A7A-6A0F-0C50-8CA6BCA1D0BB}"/>
+                <a16:creationId xmlns:a16="http://schemas.microsoft.com/office/drawing/2014/main" id="{3A4FDD95-269F-6EE6-7DA7-EDDAF9D383CF}"/>
               </a:ext>
             </a:extLst>
           </p:cNvPr>
@@ -6817,7 +6817,7 @@
           <p:cNvPr id="10" name="직사각형 9">
             <a:extLst>
               <a:ext uri="{FF2B5EF4-FFF2-40B4-BE49-F238E27FC236}">
-                <a16:creationId xmlns:a16="http://schemas.microsoft.com/office/drawing/2014/main" id="{D446945A-E1C0-63F8-12C7-12F6F1DD6550}"/>
+                <a16:creationId xmlns:a16="http://schemas.microsoft.com/office/drawing/2014/main" id="{AE65710F-A52A-9E0D-4A63-C233DCDE5BB0}"/>
               </a:ext>
             </a:extLst>
           </p:cNvPr>
@@ -6876,7 +6876,7 @@
           <p:cNvPr id="11" name="직선 연결선 10">
             <a:extLst>
               <a:ext uri="{FF2B5EF4-FFF2-40B4-BE49-F238E27FC236}">
-                <a16:creationId xmlns:a16="http://schemas.microsoft.com/office/drawing/2014/main" id="{B58E6DD1-F027-AB44-9772-F1FB86565D3F}"/>
+                <a16:creationId xmlns:a16="http://schemas.microsoft.com/office/drawing/2014/main" id="{EF8A68A7-385D-8BCA-05C5-AD7DF085EE22}"/>
               </a:ext>
             </a:extLst>
           </p:cNvPr>
@@ -6917,7 +6917,7 @@
           <p:cNvPr id="12" name="직사각형 11">
             <a:extLst>
               <a:ext uri="{FF2B5EF4-FFF2-40B4-BE49-F238E27FC236}">
-                <a16:creationId xmlns:a16="http://schemas.microsoft.com/office/drawing/2014/main" id="{559C3109-50EC-CE16-ADA0-18CA2F0CDC95}"/>
+                <a16:creationId xmlns:a16="http://schemas.microsoft.com/office/drawing/2014/main" id="{F0435191-4C86-D87D-29B9-771A603FBFF4}"/>
               </a:ext>
             </a:extLst>
           </p:cNvPr>
@@ -6976,7 +6976,7 @@
           <p:cNvPr id="13" name="직선 연결선 12">
             <a:extLst>
               <a:ext uri="{FF2B5EF4-FFF2-40B4-BE49-F238E27FC236}">
-                <a16:creationId xmlns:a16="http://schemas.microsoft.com/office/drawing/2014/main" id="{D08204AA-B762-5EC9-20CA-500E713C1AA8}"/>
+                <a16:creationId xmlns:a16="http://schemas.microsoft.com/office/drawing/2014/main" id="{428AACBA-68C5-D22C-BF0F-BC8BE939260E}"/>
               </a:ext>
             </a:extLst>
           </p:cNvPr>
@@ -7017,7 +7017,7 @@
           <p:cNvPr id="14" name="직사각형 13">
             <a:extLst>
               <a:ext uri="{FF2B5EF4-FFF2-40B4-BE49-F238E27FC236}">
-                <a16:creationId xmlns:a16="http://schemas.microsoft.com/office/drawing/2014/main" id="{C8B20198-5902-277E-B195-0A2E1ECBA012}"/>
+                <a16:creationId xmlns:a16="http://schemas.microsoft.com/office/drawing/2014/main" id="{54040DB3-9E34-61FF-0D23-73A47D11E824}"/>
               </a:ext>
             </a:extLst>
           </p:cNvPr>
@@ -7076,7 +7076,7 @@
           <p:cNvPr id="15" name="직선 연결선 14">
             <a:extLst>
               <a:ext uri="{FF2B5EF4-FFF2-40B4-BE49-F238E27FC236}">
-                <a16:creationId xmlns:a16="http://schemas.microsoft.com/office/drawing/2014/main" id="{89C62F55-423A-9499-ACE3-D309A573DD74}"/>
+                <a16:creationId xmlns:a16="http://schemas.microsoft.com/office/drawing/2014/main" id="{F6952A80-204E-8545-63D4-8569CAFE1CC0}"/>
               </a:ext>
             </a:extLst>
           </p:cNvPr>
@@ -7117,7 +7117,7 @@
           <p:cNvPr id="16" name="직사각형 15">
             <a:extLst>
               <a:ext uri="{FF2B5EF4-FFF2-40B4-BE49-F238E27FC236}">
-                <a16:creationId xmlns:a16="http://schemas.microsoft.com/office/drawing/2014/main" id="{A413CD32-F1FC-5162-F4FF-FAAD2EC249A9}"/>
+                <a16:creationId xmlns:a16="http://schemas.microsoft.com/office/drawing/2014/main" id="{39046DFF-6201-89D2-9B7B-3F4BF51926BB}"/>
               </a:ext>
             </a:extLst>
           </p:cNvPr>
@@ -7176,7 +7176,7 @@
           <p:cNvPr id="17" name="직선 연결선 16">
             <a:extLst>
               <a:ext uri="{FF2B5EF4-FFF2-40B4-BE49-F238E27FC236}">
-                <a16:creationId xmlns:a16="http://schemas.microsoft.com/office/drawing/2014/main" id="{113FE925-21B7-F1E0-4F78-0258F79CD954}"/>
+                <a16:creationId xmlns:a16="http://schemas.microsoft.com/office/drawing/2014/main" id="{FF1D2D94-7198-4CA2-F748-6755452C7BAC}"/>
               </a:ext>
             </a:extLst>
           </p:cNvPr>
@@ -7217,7 +7217,7 @@
           <p:cNvPr id="18" name="직사각형 17">
             <a:extLst>
               <a:ext uri="{FF2B5EF4-FFF2-40B4-BE49-F238E27FC236}">
-                <a16:creationId xmlns:a16="http://schemas.microsoft.com/office/drawing/2014/main" id="{14ADE710-E1C4-41D9-88AB-FBB693A38985}"/>
+                <a16:creationId xmlns:a16="http://schemas.microsoft.com/office/drawing/2014/main" id="{6E887DC6-990A-EE4A-26E2-5293EC29E8A8}"/>
               </a:ext>
             </a:extLst>
           </p:cNvPr>
@@ -7276,7 +7276,7 @@
           <p:cNvPr id="19" name="직선 연결선 18">
             <a:extLst>
               <a:ext uri="{FF2B5EF4-FFF2-40B4-BE49-F238E27FC236}">
-                <a16:creationId xmlns:a16="http://schemas.microsoft.com/office/drawing/2014/main" id="{2099592E-67EF-12A8-9EDB-7F4BFFB81AD9}"/>
+                <a16:creationId xmlns:a16="http://schemas.microsoft.com/office/drawing/2014/main" id="{2B7843CB-255F-E22C-BC55-7E2366D76E3A}"/>
               </a:ext>
             </a:extLst>
           </p:cNvPr>
@@ -7317,7 +7317,7 @@
           <p:cNvPr id="20" name="직사각형 19">
             <a:extLst>
               <a:ext uri="{FF2B5EF4-FFF2-40B4-BE49-F238E27FC236}">
-                <a16:creationId xmlns:a16="http://schemas.microsoft.com/office/drawing/2014/main" id="{0FE2F9E1-406A-49F4-58D7-0459931D4107}"/>
+                <a16:creationId xmlns:a16="http://schemas.microsoft.com/office/drawing/2014/main" id="{2A285AAB-44FA-ACF9-C6C9-E6175F60FC37}"/>
               </a:ext>
             </a:extLst>
           </p:cNvPr>
@@ -7376,7 +7376,7 @@
           <p:cNvPr id="21" name="직선 연결선 20">
             <a:extLst>
               <a:ext uri="{FF2B5EF4-FFF2-40B4-BE49-F238E27FC236}">
-                <a16:creationId xmlns:a16="http://schemas.microsoft.com/office/drawing/2014/main" id="{2228FA86-5609-F83B-A3CA-1B26CD6D845C}"/>
+                <a16:creationId xmlns:a16="http://schemas.microsoft.com/office/drawing/2014/main" id="{C49D7D2B-B9BB-D70A-41DB-B4645FBA2AED}"/>
               </a:ext>
             </a:extLst>
           </p:cNvPr>
@@ -7417,7 +7417,7 @@
           <p:cNvPr id="22" name="직사각형 21">
             <a:extLst>
               <a:ext uri="{FF2B5EF4-FFF2-40B4-BE49-F238E27FC236}">
-                <a16:creationId xmlns:a16="http://schemas.microsoft.com/office/drawing/2014/main" id="{40F59404-34BE-5C18-FAAD-191BF088087E}"/>
+                <a16:creationId xmlns:a16="http://schemas.microsoft.com/office/drawing/2014/main" id="{C68816AC-99E0-8114-4B4C-E886D58C3786}"/>
               </a:ext>
             </a:extLst>
           </p:cNvPr>
@@ -7478,7 +7478,7 @@
           <p:cNvPr id="23" name="직선 연결선 22">
             <a:extLst>
               <a:ext uri="{FF2B5EF4-FFF2-40B4-BE49-F238E27FC236}">
-                <a16:creationId xmlns:a16="http://schemas.microsoft.com/office/drawing/2014/main" id="{63BA0338-C4DD-7090-AD19-403A3CE815F6}"/>
+                <a16:creationId xmlns:a16="http://schemas.microsoft.com/office/drawing/2014/main" id="{B9B90D76-20A0-CFE8-2954-36F0A56AD6E3}"/>
               </a:ext>
             </a:extLst>
           </p:cNvPr>
@@ -7520,7 +7520,7 @@
           <p:cNvPr id="24" name="직사각형 23">
             <a:extLst>
               <a:ext uri="{FF2B5EF4-FFF2-40B4-BE49-F238E27FC236}">
-                <a16:creationId xmlns:a16="http://schemas.microsoft.com/office/drawing/2014/main" id="{9C1A602D-63EA-998A-3B31-9AA3C7BA646E}"/>
+                <a16:creationId xmlns:a16="http://schemas.microsoft.com/office/drawing/2014/main" id="{A1B19B39-A49F-EFCE-A2A4-6759BB79645B}"/>
               </a:ext>
             </a:extLst>
           </p:cNvPr>
@@ -7581,7 +7581,7 @@
           <p:cNvPr id="25" name="직선 연결선 24">
             <a:extLst>
               <a:ext uri="{FF2B5EF4-FFF2-40B4-BE49-F238E27FC236}">
-                <a16:creationId xmlns:a16="http://schemas.microsoft.com/office/drawing/2014/main" id="{B7046DE4-34EB-82C1-1FE7-FABD662E17E3}"/>
+                <a16:creationId xmlns:a16="http://schemas.microsoft.com/office/drawing/2014/main" id="{F3FABEA8-9771-5655-EEFB-CB70D1282319}"/>
               </a:ext>
             </a:extLst>
           </p:cNvPr>
@@ -7623,7 +7623,7 @@
           <p:cNvPr id="26" name="직사각형 25">
             <a:extLst>
               <a:ext uri="{FF2B5EF4-FFF2-40B4-BE49-F238E27FC236}">
-                <a16:creationId xmlns:a16="http://schemas.microsoft.com/office/drawing/2014/main" id="{D2D05EE1-5E29-C6D7-A994-64B61C616685}"/>
+                <a16:creationId xmlns:a16="http://schemas.microsoft.com/office/drawing/2014/main" id="{2D2607D9-0CB8-DC7F-3D4D-FEB80B232D1A}"/>
               </a:ext>
             </a:extLst>
           </p:cNvPr>
@@ -7684,7 +7684,7 @@
           <p:cNvPr id="27" name="직선 연결선 26">
             <a:extLst>
               <a:ext uri="{FF2B5EF4-FFF2-40B4-BE49-F238E27FC236}">
-                <a16:creationId xmlns:a16="http://schemas.microsoft.com/office/drawing/2014/main" id="{1063AF24-AA00-A9C6-8B85-3D97CB8B7D55}"/>
+                <a16:creationId xmlns:a16="http://schemas.microsoft.com/office/drawing/2014/main" id="{CC70F4D2-6DE3-5164-AC4A-DFB539FE42A2}"/>
               </a:ext>
             </a:extLst>
           </p:cNvPr>
@@ -7726,7 +7726,7 @@
           <p:cNvPr id="28" name="직사각형 27">
             <a:extLst>
               <a:ext uri="{FF2B5EF4-FFF2-40B4-BE49-F238E27FC236}">
-                <a16:creationId xmlns:a16="http://schemas.microsoft.com/office/drawing/2014/main" id="{0B78D3FE-32A8-DD9C-3FDA-E9D3AA0E1FF6}"/>
+                <a16:creationId xmlns:a16="http://schemas.microsoft.com/office/drawing/2014/main" id="{167ABC8E-2B73-013E-5DDF-71D911546DCD}"/>
               </a:ext>
             </a:extLst>
           </p:cNvPr>
@@ -7787,7 +7787,7 @@
           <p:cNvPr id="29" name="직선 연결선 28">
             <a:extLst>
               <a:ext uri="{FF2B5EF4-FFF2-40B4-BE49-F238E27FC236}">
-                <a16:creationId xmlns:a16="http://schemas.microsoft.com/office/drawing/2014/main" id="{D688B540-B130-59D7-16F6-738E7623BE35}"/>
+                <a16:creationId xmlns:a16="http://schemas.microsoft.com/office/drawing/2014/main" id="{43B992B7-88B9-290A-A324-BC61BBF9DF63}"/>
               </a:ext>
             </a:extLst>
           </p:cNvPr>
@@ -7827,7 +7827,7 @@
     </p:spTree>
     <p:extLst>
       <p:ext uri="{BB962C8B-B14F-4D97-AF65-F5344CB8AC3E}">
-        <p14:creationId xmlns:p14="http://schemas.microsoft.com/office/powerpoint/2010/main" val="995607055"/>
+        <p14:creationId xmlns:p14="http://schemas.microsoft.com/office/powerpoint/2010/main" val="3034699450"/>
       </p:ext>
     </p:extLst>
   </p:cSld>

</xml_diff>